<commit_message>
ppt + scientific paper update
</commit_message>
<xml_diff>
--- a/DAWA.pptx
+++ b/DAWA.pptx
@@ -5,7 +5,7 @@
     <p:sldMasterId id="2147483932" r:id="rId1"/>
   </p:sldMasterIdLst>
   <p:notesMasterIdLst>
-    <p:notesMasterId r:id="rId13"/>
+    <p:notesMasterId r:id="rId14"/>
   </p:notesMasterIdLst>
   <p:sldIdLst>
     <p:sldId id="256" r:id="rId2"/>
@@ -15,10 +15,11 @@
     <p:sldId id="264" r:id="rId6"/>
     <p:sldId id="265" r:id="rId7"/>
     <p:sldId id="266" r:id="rId8"/>
-    <p:sldId id="268" r:id="rId9"/>
-    <p:sldId id="261" r:id="rId10"/>
-    <p:sldId id="263" r:id="rId11"/>
-    <p:sldId id="267" r:id="rId12"/>
+    <p:sldId id="269" r:id="rId9"/>
+    <p:sldId id="268" r:id="rId10"/>
+    <p:sldId id="261" r:id="rId11"/>
+    <p:sldId id="263" r:id="rId12"/>
+    <p:sldId id="267" r:id="rId13"/>
   </p:sldIdLst>
   <p:sldSz cx="12192000" cy="6858000"/>
   <p:notesSz cx="6858000" cy="9144000"/>
@@ -978,1484 +979,7 @@
           <a:bodyPr/>
           <a:lstStyle/>
           <a:p>
-            <a:r>
-              <a:rPr lang="de-DE" dirty="0"/>
-              <a:t>At </a:t>
-            </a:r>
-            <a:r>
-              <a:rPr lang="de-DE" dirty="0" err="1"/>
-              <a:t>the</a:t>
-            </a:r>
-            <a:r>
-              <a:rPr lang="de-DE" dirty="0"/>
-              <a:t> </a:t>
-            </a:r>
-            <a:r>
-              <a:rPr lang="de-DE" dirty="0" err="1"/>
-              <a:t>beginning</a:t>
-            </a:r>
-            <a:r>
-              <a:rPr lang="de-DE" dirty="0"/>
-              <a:t> </a:t>
-            </a:r>
-            <a:r>
-              <a:rPr lang="de-DE" dirty="0" err="1"/>
-              <a:t>of</a:t>
-            </a:r>
-            <a:r>
-              <a:rPr lang="de-DE" dirty="0"/>
-              <a:t> </a:t>
-            </a:r>
-            <a:r>
-              <a:rPr lang="de-DE" dirty="0" err="1"/>
-              <a:t>the</a:t>
-            </a:r>
-            <a:r>
-              <a:rPr lang="de-DE" dirty="0"/>
-              <a:t> </a:t>
-            </a:r>
-            <a:r>
-              <a:rPr lang="de-DE" dirty="0" err="1"/>
-              <a:t>Preparation</a:t>
-            </a:r>
-            <a:r>
-              <a:rPr lang="de-DE" dirty="0"/>
-              <a:t> Phase </a:t>
-            </a:r>
-            <a:r>
-              <a:rPr lang="de-DE" dirty="0" err="1"/>
-              <a:t>we</a:t>
-            </a:r>
-            <a:r>
-              <a:rPr lang="de-DE" dirty="0"/>
-              <a:t> </a:t>
-            </a:r>
-            <a:r>
-              <a:rPr lang="de-DE" dirty="0" err="1"/>
-              <a:t>had</a:t>
-            </a:r>
-            <a:r>
-              <a:rPr lang="de-DE" dirty="0"/>
-              <a:t> </a:t>
-            </a:r>
-            <a:r>
-              <a:rPr lang="de-DE" dirty="0" err="1"/>
-              <a:t>to</a:t>
-            </a:r>
-            <a:r>
-              <a:rPr lang="de-DE" dirty="0"/>
-              <a:t> </a:t>
-            </a:r>
-            <a:r>
-              <a:rPr lang="de-DE" dirty="0" err="1"/>
-              <a:t>knew</a:t>
-            </a:r>
-            <a:r>
-              <a:rPr lang="de-DE" dirty="0"/>
-              <a:t> </a:t>
-            </a:r>
-            <a:r>
-              <a:rPr lang="de-DE" dirty="0" err="1"/>
-              <a:t>which</a:t>
-            </a:r>
-            <a:r>
-              <a:rPr lang="de-DE" dirty="0"/>
-              <a:t> </a:t>
-            </a:r>
-            <a:r>
-              <a:rPr lang="de-DE" dirty="0" err="1"/>
-              <a:t>parameters</a:t>
-            </a:r>
-            <a:r>
-              <a:rPr lang="de-DE" dirty="0"/>
-              <a:t> </a:t>
-            </a:r>
-            <a:r>
-              <a:rPr lang="de-DE" dirty="0" err="1"/>
-              <a:t>are</a:t>
-            </a:r>
-            <a:r>
-              <a:rPr lang="de-DE" dirty="0"/>
-              <a:t> </a:t>
-            </a:r>
-            <a:r>
-              <a:rPr lang="de-DE" dirty="0" err="1"/>
-              <a:t>needed</a:t>
-            </a:r>
-            <a:r>
-              <a:rPr lang="de-DE" dirty="0"/>
-              <a:t>. </a:t>
-            </a:r>
-            <a:r>
-              <a:rPr lang="de-DE" dirty="0" err="1"/>
-              <a:t>We</a:t>
-            </a:r>
-            <a:r>
-              <a:rPr lang="de-DE" dirty="0"/>
-              <a:t> </a:t>
-            </a:r>
-            <a:r>
-              <a:rPr lang="de-DE" dirty="0" err="1"/>
-              <a:t>decided</a:t>
-            </a:r>
-            <a:r>
-              <a:rPr lang="de-DE" dirty="0"/>
-              <a:t> </a:t>
-            </a:r>
-            <a:r>
-              <a:rPr lang="de-DE" dirty="0" err="1"/>
-              <a:t>to</a:t>
-            </a:r>
-            <a:r>
-              <a:rPr lang="de-DE" dirty="0"/>
-              <a:t> </a:t>
-            </a:r>
-            <a:r>
-              <a:rPr lang="de-DE" dirty="0" err="1"/>
-              <a:t>take</a:t>
-            </a:r>
-            <a:r>
-              <a:rPr lang="de-DE" dirty="0"/>
-              <a:t> </a:t>
-            </a:r>
-            <a:r>
-              <a:rPr lang="de-DE" dirty="0" err="1"/>
-              <a:t>the</a:t>
-            </a:r>
-            <a:r>
-              <a:rPr lang="de-DE" dirty="0"/>
-              <a:t> </a:t>
-            </a:r>
-            <a:r>
-              <a:rPr lang="de-DE" dirty="0" err="1"/>
-              <a:t>Divison</a:t>
-            </a:r>
-            <a:r>
-              <a:rPr lang="de-DE" dirty="0"/>
-              <a:t>, Date </a:t>
-            </a:r>
-            <a:r>
-              <a:rPr lang="de-DE" dirty="0" err="1"/>
-              <a:t>HomeTeam</a:t>
-            </a:r>
-            <a:r>
-              <a:rPr lang="de-DE" dirty="0"/>
-              <a:t>, </a:t>
-            </a:r>
-            <a:r>
-              <a:rPr lang="de-DE" dirty="0" err="1"/>
-              <a:t>AwayTeam</a:t>
-            </a:r>
-            <a:r>
-              <a:rPr lang="de-DE" dirty="0"/>
-              <a:t>, </a:t>
-            </a:r>
-            <a:r>
-              <a:rPr lang="de-DE" dirty="0" err="1"/>
-              <a:t>Full</a:t>
-            </a:r>
-            <a:r>
-              <a:rPr lang="de-DE" dirty="0"/>
-              <a:t> Time </a:t>
-            </a:r>
-            <a:r>
-              <a:rPr lang="de-DE" dirty="0" err="1"/>
-              <a:t>Away</a:t>
-            </a:r>
-            <a:r>
-              <a:rPr lang="de-DE" dirty="0"/>
-              <a:t> Goals </a:t>
-            </a:r>
-            <a:r>
-              <a:rPr lang="de-DE" dirty="0" err="1"/>
-              <a:t>which</a:t>
-            </a:r>
-            <a:r>
-              <a:rPr lang="de-DE" dirty="0"/>
-              <a:t> </a:t>
-            </a:r>
-            <a:r>
-              <a:rPr lang="de-DE" dirty="0" err="1"/>
-              <a:t>means</a:t>
-            </a:r>
-            <a:r>
-              <a:rPr lang="de-DE" dirty="0"/>
-              <a:t>: </a:t>
-            </a:r>
-            <a:r>
-              <a:rPr lang="de-DE" dirty="0" err="1"/>
-              <a:t>and</a:t>
-            </a:r>
-            <a:r>
-              <a:rPr lang="de-DE" dirty="0"/>
-              <a:t> </a:t>
-            </a:r>
-            <a:r>
-              <a:rPr lang="de-DE" dirty="0" err="1"/>
-              <a:t>Full</a:t>
-            </a:r>
-            <a:r>
-              <a:rPr lang="de-DE" dirty="0"/>
-              <a:t> Time Home Goals, </a:t>
-            </a:r>
-            <a:r>
-              <a:rPr lang="de-DE" sz="1200" b="0" i="0" u="none" strike="noStrike" kern="1200" dirty="0" err="1">
-                <a:solidFill>
-                  <a:schemeClr val="tx1"/>
-                </a:solidFill>
-                <a:effectLst/>
-                <a:latin typeface="+mn-lt"/>
-                <a:ea typeface="+mn-ea"/>
-                <a:cs typeface="+mn-cs"/>
-              </a:rPr>
-              <a:t>Full</a:t>
-            </a:r>
-            <a:r>
-              <a:rPr lang="de-DE" sz="1200" b="0" i="0" u="none" strike="noStrike" kern="1200" dirty="0">
-                <a:solidFill>
-                  <a:schemeClr val="tx1"/>
-                </a:solidFill>
-                <a:effectLst/>
-                <a:latin typeface="+mn-lt"/>
-                <a:ea typeface="+mn-ea"/>
-                <a:cs typeface="+mn-cs"/>
-              </a:rPr>
-              <a:t> Time </a:t>
-            </a:r>
-            <a:r>
-              <a:rPr lang="de-DE" sz="1200" b="0" i="0" u="none" strike="noStrike" kern="1200" dirty="0" err="1">
-                <a:solidFill>
-                  <a:schemeClr val="tx1"/>
-                </a:solidFill>
-                <a:effectLst/>
-                <a:latin typeface="+mn-lt"/>
-                <a:ea typeface="+mn-ea"/>
-                <a:cs typeface="+mn-cs"/>
-              </a:rPr>
-              <a:t>Result</a:t>
-            </a:r>
-            <a:r>
-              <a:rPr lang="de-DE" sz="1200" b="0" i="0" u="none" strike="noStrike" kern="1200" dirty="0">
-                <a:solidFill>
-                  <a:schemeClr val="tx1"/>
-                </a:solidFill>
-                <a:effectLst/>
-                <a:latin typeface="+mn-lt"/>
-                <a:ea typeface="+mn-ea"/>
-                <a:cs typeface="+mn-cs"/>
-              </a:rPr>
-              <a:t> (H=Home </a:t>
-            </a:r>
-            <a:r>
-              <a:rPr lang="de-DE" sz="1200" b="0" i="0" u="none" strike="noStrike" kern="1200" dirty="0" err="1">
-                <a:solidFill>
-                  <a:schemeClr val="tx1"/>
-                </a:solidFill>
-                <a:effectLst/>
-                <a:latin typeface="+mn-lt"/>
-                <a:ea typeface="+mn-ea"/>
-                <a:cs typeface="+mn-cs"/>
-              </a:rPr>
-              <a:t>Win</a:t>
-            </a:r>
-            <a:r>
-              <a:rPr lang="de-DE" sz="1200" b="0" i="0" u="none" strike="noStrike" kern="1200" dirty="0">
-                <a:solidFill>
-                  <a:schemeClr val="tx1"/>
-                </a:solidFill>
-                <a:effectLst/>
-                <a:latin typeface="+mn-lt"/>
-                <a:ea typeface="+mn-ea"/>
-                <a:cs typeface="+mn-cs"/>
-              </a:rPr>
-              <a:t>, D=Draw, A=</a:t>
-            </a:r>
-            <a:r>
-              <a:rPr lang="de-DE" sz="1200" b="0" i="0" u="none" strike="noStrike" kern="1200" dirty="0" err="1">
-                <a:solidFill>
-                  <a:schemeClr val="tx1"/>
-                </a:solidFill>
-                <a:effectLst/>
-                <a:latin typeface="+mn-lt"/>
-                <a:ea typeface="+mn-ea"/>
-                <a:cs typeface="+mn-cs"/>
-              </a:rPr>
-              <a:t>Away</a:t>
-            </a:r>
-            <a:r>
-              <a:rPr lang="de-DE" sz="1200" b="0" i="0" u="none" strike="noStrike" kern="1200" dirty="0">
-                <a:solidFill>
-                  <a:schemeClr val="tx1"/>
-                </a:solidFill>
-                <a:effectLst/>
-                <a:latin typeface="+mn-lt"/>
-                <a:ea typeface="+mn-ea"/>
-                <a:cs typeface="+mn-cs"/>
-              </a:rPr>
-              <a:t> </a:t>
-            </a:r>
-            <a:r>
-              <a:rPr lang="de-DE" sz="1200" b="0" i="0" u="none" strike="noStrike" kern="1200" dirty="0" err="1">
-                <a:solidFill>
-                  <a:schemeClr val="tx1"/>
-                </a:solidFill>
-                <a:effectLst/>
-                <a:latin typeface="+mn-lt"/>
-                <a:ea typeface="+mn-ea"/>
-                <a:cs typeface="+mn-cs"/>
-              </a:rPr>
-              <a:t>Win</a:t>
-            </a:r>
-            <a:r>
-              <a:rPr lang="de-DE" sz="1200" b="0" i="0" u="none" strike="noStrike" kern="1200" dirty="0">
-                <a:solidFill>
-                  <a:schemeClr val="tx1"/>
-                </a:solidFill>
-                <a:effectLst/>
-                <a:latin typeface="+mn-lt"/>
-                <a:ea typeface="+mn-ea"/>
-                <a:cs typeface="+mn-cs"/>
-              </a:rPr>
-              <a:t>)....</a:t>
-            </a:r>
-          </a:p>
-          <a:p>
-            <a:endParaRPr lang="de-DE" sz="1200" b="0" i="0" u="none" strike="noStrike" kern="1200" dirty="0">
-              <a:solidFill>
-                <a:schemeClr val="tx1"/>
-              </a:solidFill>
-              <a:effectLst/>
-              <a:latin typeface="+mn-lt"/>
-              <a:ea typeface="+mn-ea"/>
-              <a:cs typeface="+mn-cs"/>
-            </a:endParaRPr>
-          </a:p>
-          <a:p>
-            <a:r>
-              <a:rPr lang="de-DE" sz="1200" b="0" i="0" u="none" strike="noStrike" kern="1200" dirty="0">
-                <a:solidFill>
-                  <a:schemeClr val="tx1"/>
-                </a:solidFill>
-                <a:effectLst/>
-                <a:latin typeface="+mn-lt"/>
-                <a:ea typeface="+mn-ea"/>
-                <a:cs typeface="+mn-cs"/>
-              </a:rPr>
-              <a:t>I </a:t>
-            </a:r>
-            <a:r>
-              <a:rPr lang="de-DE" sz="1200" b="0" i="0" u="none" strike="noStrike" kern="1200" dirty="0" err="1">
-                <a:solidFill>
-                  <a:schemeClr val="tx1"/>
-                </a:solidFill>
-                <a:effectLst/>
-                <a:latin typeface="+mn-lt"/>
-                <a:ea typeface="+mn-ea"/>
-                <a:cs typeface="+mn-cs"/>
-              </a:rPr>
-              <a:t>did</a:t>
-            </a:r>
-            <a:r>
-              <a:rPr lang="de-DE" sz="1200" b="0" i="0" u="none" strike="noStrike" kern="1200" dirty="0">
-                <a:solidFill>
-                  <a:schemeClr val="tx1"/>
-                </a:solidFill>
-                <a:effectLst/>
-                <a:latin typeface="+mn-lt"/>
-                <a:ea typeface="+mn-ea"/>
-                <a:cs typeface="+mn-cs"/>
-              </a:rPr>
-              <a:t> </a:t>
-            </a:r>
-            <a:r>
-              <a:rPr lang="de-DE" sz="1200" b="0" i="0" u="none" strike="noStrike" kern="1200" dirty="0" err="1">
-                <a:solidFill>
-                  <a:schemeClr val="tx1"/>
-                </a:solidFill>
-                <a:effectLst/>
-                <a:latin typeface="+mn-lt"/>
-                <a:ea typeface="+mn-ea"/>
-                <a:cs typeface="+mn-cs"/>
-              </a:rPr>
-              <a:t>this</a:t>
-            </a:r>
-            <a:r>
-              <a:rPr lang="de-DE" sz="1200" b="0" i="0" u="none" strike="noStrike" kern="1200" dirty="0">
-                <a:solidFill>
-                  <a:schemeClr val="tx1"/>
-                </a:solidFill>
-                <a:effectLst/>
-                <a:latin typeface="+mn-lt"/>
-                <a:ea typeface="+mn-ea"/>
-                <a:cs typeface="+mn-cs"/>
-              </a:rPr>
-              <a:t> </a:t>
-            </a:r>
-            <a:r>
-              <a:rPr lang="de-DE" sz="1200" b="0" i="0" u="none" strike="noStrike" kern="1200" dirty="0" err="1">
-                <a:solidFill>
-                  <a:schemeClr val="tx1"/>
-                </a:solidFill>
-                <a:effectLst/>
-                <a:latin typeface="+mn-lt"/>
-                <a:ea typeface="+mn-ea"/>
-                <a:cs typeface="+mn-cs"/>
-              </a:rPr>
-              <a:t>first</a:t>
-            </a:r>
-            <a:r>
-              <a:rPr lang="de-DE" sz="1200" b="0" i="0" u="none" strike="noStrike" kern="1200" dirty="0">
-                <a:solidFill>
-                  <a:schemeClr val="tx1"/>
-                </a:solidFill>
-                <a:effectLst/>
-                <a:latin typeface="+mn-lt"/>
-                <a:ea typeface="+mn-ea"/>
-                <a:cs typeface="+mn-cs"/>
-              </a:rPr>
-              <a:t> </a:t>
-            </a:r>
-            <a:r>
-              <a:rPr lang="de-DE" sz="1200" b="0" i="0" u="none" strike="noStrike" kern="1200" dirty="0" err="1">
-                <a:solidFill>
-                  <a:schemeClr val="tx1"/>
-                </a:solidFill>
-                <a:effectLst/>
-                <a:latin typeface="+mn-lt"/>
-                <a:ea typeface="+mn-ea"/>
-                <a:cs typeface="+mn-cs"/>
-              </a:rPr>
-              <a:t>cleaning</a:t>
-            </a:r>
-            <a:r>
-              <a:rPr lang="de-DE" sz="1200" b="0" i="0" u="none" strike="noStrike" kern="1200" dirty="0">
-                <a:solidFill>
-                  <a:schemeClr val="tx1"/>
-                </a:solidFill>
-                <a:effectLst/>
-                <a:latin typeface="+mn-lt"/>
-                <a:ea typeface="+mn-ea"/>
-                <a:cs typeface="+mn-cs"/>
-              </a:rPr>
-              <a:t> </a:t>
-            </a:r>
-            <a:r>
-              <a:rPr lang="de-DE" sz="1200" b="0" i="0" u="none" strike="noStrike" kern="1200" dirty="0" err="1">
-                <a:solidFill>
-                  <a:schemeClr val="tx1"/>
-                </a:solidFill>
-                <a:effectLst/>
-                <a:latin typeface="+mn-lt"/>
-                <a:ea typeface="+mn-ea"/>
-                <a:cs typeface="+mn-cs"/>
-              </a:rPr>
-              <a:t>step</a:t>
-            </a:r>
-            <a:r>
-              <a:rPr lang="de-DE" sz="1200" b="0" i="0" u="none" strike="noStrike" kern="1200" dirty="0">
-                <a:solidFill>
-                  <a:schemeClr val="tx1"/>
-                </a:solidFill>
-                <a:effectLst/>
-                <a:latin typeface="+mn-lt"/>
-                <a:ea typeface="+mn-ea"/>
-                <a:cs typeface="+mn-cs"/>
-              </a:rPr>
-              <a:t> in Excel </a:t>
-            </a:r>
-            <a:r>
-              <a:rPr lang="de-DE" sz="1200" b="0" i="0" u="none" strike="noStrike" kern="1200" dirty="0" err="1">
-                <a:solidFill>
-                  <a:schemeClr val="tx1"/>
-                </a:solidFill>
-                <a:effectLst/>
-                <a:latin typeface="+mn-lt"/>
-                <a:ea typeface="+mn-ea"/>
-                <a:cs typeface="+mn-cs"/>
-              </a:rPr>
-              <a:t>and</a:t>
-            </a:r>
-            <a:r>
-              <a:rPr lang="de-DE" sz="1200" b="0" i="0" u="none" strike="noStrike" kern="1200" dirty="0">
-                <a:solidFill>
-                  <a:schemeClr val="tx1"/>
-                </a:solidFill>
-                <a:effectLst/>
-                <a:latin typeface="+mn-lt"/>
-                <a:ea typeface="+mn-ea"/>
-                <a:cs typeface="+mn-cs"/>
-              </a:rPr>
-              <a:t> </a:t>
-            </a:r>
-            <a:r>
-              <a:rPr lang="de-DE" sz="1200" b="0" i="0" u="none" strike="noStrike" kern="1200" dirty="0" err="1">
-                <a:solidFill>
-                  <a:schemeClr val="tx1"/>
-                </a:solidFill>
-                <a:effectLst/>
-                <a:latin typeface="+mn-lt"/>
-                <a:ea typeface="+mn-ea"/>
-                <a:cs typeface="+mn-cs"/>
-              </a:rPr>
-              <a:t>first</a:t>
-            </a:r>
-            <a:r>
-              <a:rPr lang="de-DE" sz="1200" b="0" i="0" u="none" strike="noStrike" kern="1200" dirty="0">
-                <a:solidFill>
-                  <a:schemeClr val="tx1"/>
-                </a:solidFill>
-                <a:effectLst/>
-                <a:latin typeface="+mn-lt"/>
-                <a:ea typeface="+mn-ea"/>
-                <a:cs typeface="+mn-cs"/>
-              </a:rPr>
-              <a:t> </a:t>
-            </a:r>
-            <a:r>
-              <a:rPr lang="de-DE" sz="1200" b="0" i="0" u="none" strike="noStrike" kern="1200" dirty="0" err="1">
-                <a:solidFill>
-                  <a:schemeClr val="tx1"/>
-                </a:solidFill>
-                <a:effectLst/>
-                <a:latin typeface="+mn-lt"/>
-                <a:ea typeface="+mn-ea"/>
-                <a:cs typeface="+mn-cs"/>
-              </a:rPr>
-              <a:t>seperated</a:t>
-            </a:r>
-            <a:r>
-              <a:rPr lang="de-DE" sz="1200" b="0" i="0" u="none" strike="noStrike" kern="1200" dirty="0">
-                <a:solidFill>
-                  <a:schemeClr val="tx1"/>
-                </a:solidFill>
-                <a:effectLst/>
-                <a:latin typeface="+mn-lt"/>
-                <a:ea typeface="+mn-ea"/>
-                <a:cs typeface="+mn-cs"/>
-              </a:rPr>
-              <a:t> all </a:t>
-            </a:r>
-            <a:r>
-              <a:rPr lang="de-DE" sz="1200" b="0" i="0" u="none" strike="noStrike" kern="1200" dirty="0" err="1">
-                <a:solidFill>
-                  <a:schemeClr val="tx1"/>
-                </a:solidFill>
-                <a:effectLst/>
-                <a:latin typeface="+mn-lt"/>
-                <a:ea typeface="+mn-ea"/>
-                <a:cs typeface="+mn-cs"/>
-              </a:rPr>
-              <a:t>the</a:t>
-            </a:r>
-            <a:r>
-              <a:rPr lang="de-DE" sz="1200" b="0" i="0" u="none" strike="noStrike" kern="1200" dirty="0">
-                <a:solidFill>
-                  <a:schemeClr val="tx1"/>
-                </a:solidFill>
-                <a:effectLst/>
-                <a:latin typeface="+mn-lt"/>
-                <a:ea typeface="+mn-ea"/>
-                <a:cs typeface="+mn-cs"/>
-              </a:rPr>
-              <a:t> </a:t>
-            </a:r>
-            <a:r>
-              <a:rPr lang="de-DE" sz="1200" b="0" i="0" u="none" strike="noStrike" kern="1200" dirty="0" err="1">
-                <a:solidFill>
-                  <a:schemeClr val="tx1"/>
-                </a:solidFill>
-                <a:effectLst/>
-                <a:latin typeface="+mn-lt"/>
-                <a:ea typeface="+mn-ea"/>
-                <a:cs typeface="+mn-cs"/>
-              </a:rPr>
-              <a:t>parameter</a:t>
-            </a:r>
-            <a:r>
-              <a:rPr lang="de-DE" sz="1200" b="0" i="0" u="none" strike="noStrike" kern="1200" dirty="0">
-                <a:solidFill>
-                  <a:schemeClr val="tx1"/>
-                </a:solidFill>
-                <a:effectLst/>
-                <a:latin typeface="+mn-lt"/>
-                <a:ea typeface="+mn-ea"/>
-                <a:cs typeface="+mn-cs"/>
-              </a:rPr>
-              <a:t> in </a:t>
-            </a:r>
-            <a:r>
-              <a:rPr lang="de-DE" sz="1200" b="0" i="0" u="none" strike="noStrike" kern="1200" dirty="0" err="1">
-                <a:solidFill>
-                  <a:schemeClr val="tx1"/>
-                </a:solidFill>
-                <a:effectLst/>
-                <a:latin typeface="+mn-lt"/>
-                <a:ea typeface="+mn-ea"/>
-                <a:cs typeface="+mn-cs"/>
-              </a:rPr>
-              <a:t>diffrent</a:t>
-            </a:r>
-            <a:r>
-              <a:rPr lang="de-DE" sz="1200" b="0" i="0" u="none" strike="noStrike" kern="1200" dirty="0">
-                <a:solidFill>
-                  <a:schemeClr val="tx1"/>
-                </a:solidFill>
-                <a:effectLst/>
-                <a:latin typeface="+mn-lt"/>
-                <a:ea typeface="+mn-ea"/>
-                <a:cs typeface="+mn-cs"/>
-              </a:rPr>
-              <a:t> </a:t>
-            </a:r>
-            <a:r>
-              <a:rPr lang="de-DE" sz="1200" b="0" i="0" u="none" strike="noStrike" kern="1200" dirty="0" err="1">
-                <a:solidFill>
-                  <a:schemeClr val="tx1"/>
-                </a:solidFill>
-                <a:effectLst/>
-                <a:latin typeface="+mn-lt"/>
-                <a:ea typeface="+mn-ea"/>
-                <a:cs typeface="+mn-cs"/>
-              </a:rPr>
-              <a:t>columns</a:t>
-            </a:r>
-            <a:r>
-              <a:rPr lang="de-DE" sz="1200" b="0" i="0" u="none" strike="noStrike" kern="1200" dirty="0">
-                <a:solidFill>
-                  <a:schemeClr val="tx1"/>
-                </a:solidFill>
-                <a:effectLst/>
-                <a:latin typeface="+mn-lt"/>
-                <a:ea typeface="+mn-ea"/>
-                <a:cs typeface="+mn-cs"/>
-              </a:rPr>
-              <a:t>.... After </a:t>
-            </a:r>
-            <a:r>
-              <a:rPr lang="de-DE" sz="1200" b="0" i="0" u="none" strike="noStrike" kern="1200" dirty="0" err="1">
-                <a:solidFill>
-                  <a:schemeClr val="tx1"/>
-                </a:solidFill>
-                <a:effectLst/>
-                <a:latin typeface="+mn-lt"/>
-                <a:ea typeface="+mn-ea"/>
-                <a:cs typeface="+mn-cs"/>
-              </a:rPr>
-              <a:t>that</a:t>
-            </a:r>
-            <a:r>
-              <a:rPr lang="de-DE" sz="1200" b="0" i="0" u="none" strike="noStrike" kern="1200" dirty="0">
-                <a:solidFill>
-                  <a:schemeClr val="tx1"/>
-                </a:solidFill>
-                <a:effectLst/>
-                <a:latin typeface="+mn-lt"/>
-                <a:ea typeface="+mn-ea"/>
-                <a:cs typeface="+mn-cs"/>
-              </a:rPr>
-              <a:t> I </a:t>
-            </a:r>
-            <a:r>
-              <a:rPr lang="de-DE" sz="1200" b="0" i="0" u="none" strike="noStrike" kern="1200" dirty="0" err="1">
-                <a:solidFill>
-                  <a:schemeClr val="tx1"/>
-                </a:solidFill>
-                <a:effectLst/>
-                <a:latin typeface="+mn-lt"/>
-                <a:ea typeface="+mn-ea"/>
-                <a:cs typeface="+mn-cs"/>
-              </a:rPr>
-              <a:t>deleted</a:t>
-            </a:r>
-            <a:r>
-              <a:rPr lang="de-DE" sz="1200" b="0" i="0" u="none" strike="noStrike" kern="1200" dirty="0">
-                <a:solidFill>
-                  <a:schemeClr val="tx1"/>
-                </a:solidFill>
-                <a:effectLst/>
-                <a:latin typeface="+mn-lt"/>
-                <a:ea typeface="+mn-ea"/>
-                <a:cs typeface="+mn-cs"/>
-              </a:rPr>
-              <a:t> </a:t>
-            </a:r>
-            <a:r>
-              <a:rPr lang="de-DE" sz="1200" b="0" i="0" u="none" strike="noStrike" kern="1200" dirty="0" err="1">
-                <a:solidFill>
-                  <a:schemeClr val="tx1"/>
-                </a:solidFill>
-                <a:effectLst/>
-                <a:latin typeface="+mn-lt"/>
-                <a:ea typeface="+mn-ea"/>
-                <a:cs typeface="+mn-cs"/>
-              </a:rPr>
-              <a:t>the</a:t>
-            </a:r>
-            <a:r>
-              <a:rPr lang="de-DE" sz="1200" b="0" i="0" u="none" strike="noStrike" kern="1200" dirty="0">
-                <a:solidFill>
-                  <a:schemeClr val="tx1"/>
-                </a:solidFill>
-                <a:effectLst/>
-                <a:latin typeface="+mn-lt"/>
-                <a:ea typeface="+mn-ea"/>
-                <a:cs typeface="+mn-cs"/>
-              </a:rPr>
-              <a:t> not </a:t>
-            </a:r>
-            <a:r>
-              <a:rPr lang="de-DE" sz="1200" b="0" i="0" u="none" strike="noStrike" kern="1200" dirty="0" err="1">
-                <a:solidFill>
-                  <a:schemeClr val="tx1"/>
-                </a:solidFill>
-                <a:effectLst/>
-                <a:latin typeface="+mn-lt"/>
-                <a:ea typeface="+mn-ea"/>
-                <a:cs typeface="+mn-cs"/>
-              </a:rPr>
-              <a:t>needed</a:t>
-            </a:r>
-            <a:r>
-              <a:rPr lang="de-DE" sz="1200" b="0" i="0" u="none" strike="noStrike" kern="1200" dirty="0">
-                <a:solidFill>
-                  <a:schemeClr val="tx1"/>
-                </a:solidFill>
-                <a:effectLst/>
-                <a:latin typeface="+mn-lt"/>
-                <a:ea typeface="+mn-ea"/>
-                <a:cs typeface="+mn-cs"/>
-              </a:rPr>
-              <a:t> </a:t>
-            </a:r>
-            <a:r>
-              <a:rPr lang="de-DE" sz="1200" b="0" i="0" u="none" strike="noStrike" kern="1200" dirty="0" err="1">
-                <a:solidFill>
-                  <a:schemeClr val="tx1"/>
-                </a:solidFill>
-                <a:effectLst/>
-                <a:latin typeface="+mn-lt"/>
-                <a:ea typeface="+mn-ea"/>
-                <a:cs typeface="+mn-cs"/>
-              </a:rPr>
-              <a:t>columns</a:t>
-            </a:r>
-            <a:r>
-              <a:rPr lang="de-DE" sz="1200" b="0" i="0" u="none" strike="noStrike" kern="1200" dirty="0">
-                <a:solidFill>
-                  <a:schemeClr val="tx1"/>
-                </a:solidFill>
-                <a:effectLst/>
-                <a:latin typeface="+mn-lt"/>
-                <a:ea typeface="+mn-ea"/>
-                <a:cs typeface="+mn-cs"/>
-              </a:rPr>
-              <a:t>....</a:t>
-            </a:r>
-            <a:r>
-              <a:rPr lang="de-DE" sz="1200" b="0" i="0" u="none" strike="noStrike" kern="1200" dirty="0" err="1">
-                <a:solidFill>
-                  <a:schemeClr val="tx1"/>
-                </a:solidFill>
-                <a:effectLst/>
-                <a:latin typeface="+mn-lt"/>
-                <a:ea typeface="+mn-ea"/>
-                <a:cs typeface="+mn-cs"/>
-              </a:rPr>
-              <a:t>for</a:t>
-            </a:r>
-            <a:r>
-              <a:rPr lang="de-DE" sz="1200" b="0" i="0" u="none" strike="noStrike" kern="1200" dirty="0">
-                <a:solidFill>
-                  <a:schemeClr val="tx1"/>
-                </a:solidFill>
-                <a:effectLst/>
-                <a:latin typeface="+mn-lt"/>
-                <a:ea typeface="+mn-ea"/>
-                <a:cs typeface="+mn-cs"/>
-              </a:rPr>
-              <a:t> </a:t>
-            </a:r>
-            <a:r>
-              <a:rPr lang="de-DE" sz="1200" b="0" i="0" u="none" strike="noStrike" kern="1200" dirty="0" err="1">
-                <a:solidFill>
-                  <a:schemeClr val="tx1"/>
-                </a:solidFill>
-                <a:effectLst/>
-                <a:latin typeface="+mn-lt"/>
-                <a:ea typeface="+mn-ea"/>
-                <a:cs typeface="+mn-cs"/>
-              </a:rPr>
-              <a:t>each</a:t>
-            </a:r>
-            <a:r>
-              <a:rPr lang="de-DE" sz="1200" b="0" i="0" u="none" strike="noStrike" kern="1200" dirty="0">
-                <a:solidFill>
-                  <a:schemeClr val="tx1"/>
-                </a:solidFill>
-                <a:effectLst/>
-                <a:latin typeface="+mn-lt"/>
-                <a:ea typeface="+mn-ea"/>
-                <a:cs typeface="+mn-cs"/>
-              </a:rPr>
-              <a:t> </a:t>
-            </a:r>
-            <a:r>
-              <a:rPr lang="de-DE" sz="1200" b="0" i="0" u="none" strike="noStrike" kern="1200" dirty="0" err="1">
-                <a:solidFill>
-                  <a:schemeClr val="tx1"/>
-                </a:solidFill>
-                <a:effectLst/>
-                <a:latin typeface="+mn-lt"/>
-                <a:ea typeface="+mn-ea"/>
-                <a:cs typeface="+mn-cs"/>
-              </a:rPr>
-              <a:t>season</a:t>
-            </a:r>
-            <a:endParaRPr lang="de-DE" sz="1200" b="0" i="0" u="none" strike="noStrike" kern="1200" dirty="0">
-              <a:solidFill>
-                <a:schemeClr val="tx1"/>
-              </a:solidFill>
-              <a:effectLst/>
-              <a:latin typeface="+mn-lt"/>
-              <a:ea typeface="+mn-ea"/>
-              <a:cs typeface="+mn-cs"/>
-            </a:endParaRPr>
-          </a:p>
-          <a:p>
-            <a:endParaRPr lang="de-DE" sz="1200" b="0" i="0" u="none" strike="noStrike" kern="1200" dirty="0">
-              <a:solidFill>
-                <a:schemeClr val="tx1"/>
-              </a:solidFill>
-              <a:effectLst/>
-              <a:latin typeface="+mn-lt"/>
-              <a:ea typeface="+mn-ea"/>
-              <a:cs typeface="+mn-cs"/>
-            </a:endParaRPr>
-          </a:p>
-          <a:p>
-            <a:r>
-              <a:rPr lang="de-DE" sz="1200" b="0" i="0" u="none" strike="noStrike" kern="1200" dirty="0">
-                <a:solidFill>
-                  <a:schemeClr val="tx1"/>
-                </a:solidFill>
-                <a:effectLst/>
-                <a:latin typeface="+mn-lt"/>
-                <a:ea typeface="+mn-ea"/>
-                <a:cs typeface="+mn-cs"/>
-              </a:rPr>
-              <a:t>Next </a:t>
-            </a:r>
-            <a:r>
-              <a:rPr lang="de-DE" sz="1200" b="0" i="0" u="none" strike="noStrike" kern="1200" dirty="0" err="1">
-                <a:solidFill>
-                  <a:schemeClr val="tx1"/>
-                </a:solidFill>
-                <a:effectLst/>
-                <a:latin typeface="+mn-lt"/>
-                <a:ea typeface="+mn-ea"/>
-                <a:cs typeface="+mn-cs"/>
-              </a:rPr>
-              <a:t>step</a:t>
-            </a:r>
-            <a:r>
-              <a:rPr lang="de-DE" sz="1200" b="0" i="0" u="none" strike="noStrike" kern="1200" dirty="0">
-                <a:solidFill>
-                  <a:schemeClr val="tx1"/>
-                </a:solidFill>
-                <a:effectLst/>
-                <a:latin typeface="+mn-lt"/>
-                <a:ea typeface="+mn-ea"/>
-                <a:cs typeface="+mn-cs"/>
-              </a:rPr>
-              <a:t> was </a:t>
-            </a:r>
-            <a:r>
-              <a:rPr lang="de-DE" sz="1200" b="0" i="0" u="none" strike="noStrike" kern="1200" dirty="0" err="1">
-                <a:solidFill>
-                  <a:schemeClr val="tx1"/>
-                </a:solidFill>
-                <a:effectLst/>
-                <a:latin typeface="+mn-lt"/>
-                <a:ea typeface="+mn-ea"/>
-                <a:cs typeface="+mn-cs"/>
-              </a:rPr>
-              <a:t>to</a:t>
-            </a:r>
-            <a:r>
-              <a:rPr lang="de-DE" sz="1200" b="0" i="0" u="none" strike="noStrike" kern="1200" dirty="0">
-                <a:solidFill>
-                  <a:schemeClr val="tx1"/>
-                </a:solidFill>
-                <a:effectLst/>
-                <a:latin typeface="+mn-lt"/>
-                <a:ea typeface="+mn-ea"/>
-                <a:cs typeface="+mn-cs"/>
-              </a:rPr>
-              <a:t> </a:t>
-            </a:r>
-            <a:r>
-              <a:rPr lang="de-DE" sz="1200" b="0" i="0" u="none" strike="noStrike" kern="1200" dirty="0" err="1">
-                <a:solidFill>
-                  <a:schemeClr val="tx1"/>
-                </a:solidFill>
-                <a:effectLst/>
-                <a:latin typeface="+mn-lt"/>
-                <a:ea typeface="+mn-ea"/>
-                <a:cs typeface="+mn-cs"/>
-              </a:rPr>
-              <a:t>put</a:t>
-            </a:r>
-            <a:r>
-              <a:rPr lang="de-DE" sz="1200" b="0" i="0" u="none" strike="noStrike" kern="1200" dirty="0">
-                <a:solidFill>
-                  <a:schemeClr val="tx1"/>
-                </a:solidFill>
-                <a:effectLst/>
-                <a:latin typeface="+mn-lt"/>
-                <a:ea typeface="+mn-ea"/>
-                <a:cs typeface="+mn-cs"/>
-              </a:rPr>
-              <a:t> </a:t>
-            </a:r>
-            <a:r>
-              <a:rPr lang="de-DE" sz="1200" b="0" i="0" u="none" strike="noStrike" kern="1200" dirty="0" err="1">
-                <a:solidFill>
-                  <a:schemeClr val="tx1"/>
-                </a:solidFill>
-                <a:effectLst/>
-                <a:latin typeface="+mn-lt"/>
-                <a:ea typeface="+mn-ea"/>
-                <a:cs typeface="+mn-cs"/>
-              </a:rPr>
-              <a:t>this</a:t>
-            </a:r>
-            <a:r>
-              <a:rPr lang="de-DE" sz="1200" b="0" i="0" u="none" strike="noStrike" kern="1200" dirty="0">
-                <a:solidFill>
-                  <a:schemeClr val="tx1"/>
-                </a:solidFill>
-                <a:effectLst/>
-                <a:latin typeface="+mn-lt"/>
-                <a:ea typeface="+mn-ea"/>
-                <a:cs typeface="+mn-cs"/>
-              </a:rPr>
-              <a:t> </a:t>
-            </a:r>
-            <a:r>
-              <a:rPr lang="de-DE" sz="1200" b="0" i="0" u="none" strike="noStrike" kern="1200" dirty="0" err="1">
-                <a:solidFill>
-                  <a:schemeClr val="tx1"/>
-                </a:solidFill>
-                <a:effectLst/>
-                <a:latin typeface="+mn-lt"/>
-                <a:ea typeface="+mn-ea"/>
-                <a:cs typeface="+mn-cs"/>
-              </a:rPr>
-              <a:t>data</a:t>
-            </a:r>
-            <a:r>
-              <a:rPr lang="de-DE" sz="1200" b="0" i="0" u="none" strike="noStrike" kern="1200" dirty="0">
-                <a:solidFill>
-                  <a:schemeClr val="tx1"/>
-                </a:solidFill>
-                <a:effectLst/>
-                <a:latin typeface="+mn-lt"/>
-                <a:ea typeface="+mn-ea"/>
-                <a:cs typeface="+mn-cs"/>
-              </a:rPr>
-              <a:t> via </a:t>
-            </a:r>
-            <a:r>
-              <a:rPr lang="de-DE" sz="1200" b="0" i="0" u="none" strike="noStrike" kern="1200" dirty="0" err="1">
-                <a:solidFill>
-                  <a:schemeClr val="tx1"/>
-                </a:solidFill>
-                <a:effectLst/>
-                <a:latin typeface="+mn-lt"/>
-                <a:ea typeface="+mn-ea"/>
-                <a:cs typeface="+mn-cs"/>
-              </a:rPr>
-              <a:t>phpmyadmin</a:t>
-            </a:r>
-            <a:r>
-              <a:rPr lang="de-DE" sz="1200" b="0" i="0" u="none" strike="noStrike" kern="1200" dirty="0">
-                <a:solidFill>
-                  <a:schemeClr val="tx1"/>
-                </a:solidFill>
-                <a:effectLst/>
-                <a:latin typeface="+mn-lt"/>
-                <a:ea typeface="+mn-ea"/>
-                <a:cs typeface="+mn-cs"/>
-              </a:rPr>
-              <a:t> </a:t>
-            </a:r>
-            <a:r>
-              <a:rPr lang="de-DE" sz="1200" b="0" i="0" u="none" strike="noStrike" kern="1200" dirty="0" err="1">
-                <a:solidFill>
-                  <a:schemeClr val="tx1"/>
-                </a:solidFill>
-                <a:effectLst/>
-                <a:latin typeface="+mn-lt"/>
-                <a:ea typeface="+mn-ea"/>
-                <a:cs typeface="+mn-cs"/>
-              </a:rPr>
-              <a:t>into</a:t>
-            </a:r>
-            <a:r>
-              <a:rPr lang="de-DE" sz="1200" b="0" i="0" u="none" strike="noStrike" kern="1200" dirty="0">
-                <a:solidFill>
-                  <a:schemeClr val="tx1"/>
-                </a:solidFill>
-                <a:effectLst/>
-                <a:latin typeface="+mn-lt"/>
-                <a:ea typeface="+mn-ea"/>
-                <a:cs typeface="+mn-cs"/>
-              </a:rPr>
-              <a:t> </a:t>
-            </a:r>
-            <a:r>
-              <a:rPr lang="de-DE" sz="1200" b="0" i="0" u="none" strike="noStrike" kern="1200" dirty="0" err="1">
-                <a:solidFill>
-                  <a:schemeClr val="tx1"/>
-                </a:solidFill>
-                <a:effectLst/>
-                <a:latin typeface="+mn-lt"/>
-                <a:ea typeface="+mn-ea"/>
-                <a:cs typeface="+mn-cs"/>
-              </a:rPr>
-              <a:t>the</a:t>
-            </a:r>
-            <a:r>
-              <a:rPr lang="de-DE" sz="1200" b="0" i="0" u="none" strike="noStrike" kern="1200" dirty="0">
-                <a:solidFill>
-                  <a:schemeClr val="tx1"/>
-                </a:solidFill>
-                <a:effectLst/>
-                <a:latin typeface="+mn-lt"/>
-                <a:ea typeface="+mn-ea"/>
-                <a:cs typeface="+mn-cs"/>
-              </a:rPr>
-              <a:t> </a:t>
-            </a:r>
-            <a:r>
-              <a:rPr lang="de-DE" sz="1200" b="0" i="0" u="none" strike="noStrike" kern="1200" dirty="0" err="1">
-                <a:solidFill>
-                  <a:schemeClr val="tx1"/>
-                </a:solidFill>
-                <a:effectLst/>
-                <a:latin typeface="+mn-lt"/>
-                <a:ea typeface="+mn-ea"/>
-                <a:cs typeface="+mn-cs"/>
-              </a:rPr>
-              <a:t>db</a:t>
-            </a:r>
-            <a:r>
-              <a:rPr lang="de-DE" sz="1200" b="0" i="0" u="none" strike="noStrike" kern="1200" dirty="0">
-                <a:solidFill>
-                  <a:schemeClr val="tx1"/>
-                </a:solidFill>
-                <a:effectLst/>
-                <a:latin typeface="+mn-lt"/>
-                <a:ea typeface="+mn-ea"/>
-                <a:cs typeface="+mn-cs"/>
-              </a:rPr>
-              <a:t>, </a:t>
-            </a:r>
-            <a:r>
-              <a:rPr lang="de-DE" sz="1200" b="0" i="0" u="none" strike="noStrike" kern="1200" dirty="0" err="1">
-                <a:solidFill>
-                  <a:schemeClr val="tx1"/>
-                </a:solidFill>
-                <a:effectLst/>
-                <a:latin typeface="+mn-lt"/>
-                <a:ea typeface="+mn-ea"/>
-                <a:cs typeface="+mn-cs"/>
-              </a:rPr>
-              <a:t>compress</a:t>
-            </a:r>
-            <a:r>
-              <a:rPr lang="de-DE" sz="1200" b="0" i="0" u="none" strike="noStrike" kern="1200" dirty="0">
-                <a:solidFill>
-                  <a:schemeClr val="tx1"/>
-                </a:solidFill>
-                <a:effectLst/>
-                <a:latin typeface="+mn-lt"/>
-                <a:ea typeface="+mn-ea"/>
-                <a:cs typeface="+mn-cs"/>
-              </a:rPr>
-              <a:t> </a:t>
-            </a:r>
-            <a:r>
-              <a:rPr lang="de-DE" sz="1200" b="0" i="0" u="none" strike="noStrike" kern="1200" dirty="0" err="1">
-                <a:solidFill>
-                  <a:schemeClr val="tx1"/>
-                </a:solidFill>
-                <a:effectLst/>
-                <a:latin typeface="+mn-lt"/>
-                <a:ea typeface="+mn-ea"/>
-                <a:cs typeface="+mn-cs"/>
-              </a:rPr>
-              <a:t>the</a:t>
-            </a:r>
-            <a:r>
-              <a:rPr lang="de-DE" sz="1200" b="0" i="0" u="none" strike="noStrike" kern="1200" dirty="0">
-                <a:solidFill>
-                  <a:schemeClr val="tx1"/>
-                </a:solidFill>
-                <a:effectLst/>
-                <a:latin typeface="+mn-lt"/>
-                <a:ea typeface="+mn-ea"/>
-                <a:cs typeface="+mn-cs"/>
-              </a:rPr>
-              <a:t> </a:t>
-            </a:r>
-            <a:r>
-              <a:rPr lang="de-DE" sz="1200" b="0" i="0" u="none" strike="noStrike" kern="1200" dirty="0" err="1">
-                <a:solidFill>
-                  <a:schemeClr val="tx1"/>
-                </a:solidFill>
-                <a:effectLst/>
-                <a:latin typeface="+mn-lt"/>
-                <a:ea typeface="+mn-ea"/>
-                <a:cs typeface="+mn-cs"/>
-              </a:rPr>
-              <a:t>csv</a:t>
-            </a:r>
-            <a:r>
-              <a:rPr lang="de-DE" sz="1200" b="0" i="0" u="none" strike="noStrike" kern="1200" dirty="0">
-                <a:solidFill>
-                  <a:schemeClr val="tx1"/>
-                </a:solidFill>
-                <a:effectLst/>
-                <a:latin typeface="+mn-lt"/>
-                <a:ea typeface="+mn-ea"/>
-                <a:cs typeface="+mn-cs"/>
-              </a:rPr>
-              <a:t> </a:t>
-            </a:r>
-            <a:r>
-              <a:rPr lang="de-DE" sz="1200" b="0" i="0" u="none" strike="noStrike" kern="1200" dirty="0" err="1">
-                <a:solidFill>
-                  <a:schemeClr val="tx1"/>
-                </a:solidFill>
-                <a:effectLst/>
-                <a:latin typeface="+mn-lt"/>
-                <a:ea typeface="+mn-ea"/>
-                <a:cs typeface="+mn-cs"/>
-              </a:rPr>
-              <a:t>file</a:t>
-            </a:r>
-            <a:r>
-              <a:rPr lang="de-DE" sz="1200" b="0" i="0" u="none" strike="noStrike" kern="1200" dirty="0">
-                <a:solidFill>
-                  <a:schemeClr val="tx1"/>
-                </a:solidFill>
-                <a:effectLst/>
-                <a:latin typeface="+mn-lt"/>
-                <a:ea typeface="+mn-ea"/>
-                <a:cs typeface="+mn-cs"/>
-              </a:rPr>
-              <a:t> </a:t>
-            </a:r>
-            <a:r>
-              <a:rPr lang="de-DE" sz="1200" b="0" i="0" u="none" strike="noStrike" kern="1200" dirty="0" err="1">
-                <a:solidFill>
-                  <a:schemeClr val="tx1"/>
-                </a:solidFill>
-                <a:effectLst/>
-                <a:latin typeface="+mn-lt"/>
-                <a:ea typeface="+mn-ea"/>
-                <a:cs typeface="+mn-cs"/>
-              </a:rPr>
-              <a:t>into</a:t>
-            </a:r>
-            <a:r>
-              <a:rPr lang="de-DE" sz="1200" b="0" i="0" u="none" strike="noStrike" kern="1200" dirty="0">
-                <a:solidFill>
-                  <a:schemeClr val="tx1"/>
-                </a:solidFill>
-                <a:effectLst/>
-                <a:latin typeface="+mn-lt"/>
-                <a:ea typeface="+mn-ea"/>
-                <a:cs typeface="+mn-cs"/>
-              </a:rPr>
-              <a:t> </a:t>
-            </a:r>
-            <a:r>
-              <a:rPr lang="de-DE" sz="1200" b="0" i="0" u="none" strike="noStrike" kern="1200" dirty="0" err="1">
-                <a:solidFill>
-                  <a:schemeClr val="tx1"/>
-                </a:solidFill>
-                <a:effectLst/>
-                <a:latin typeface="+mn-lt"/>
-                <a:ea typeface="+mn-ea"/>
-                <a:cs typeface="+mn-cs"/>
-              </a:rPr>
-              <a:t>zip</a:t>
-            </a:r>
-            <a:r>
-              <a:rPr lang="de-DE" sz="1200" b="0" i="0" u="none" strike="noStrike" kern="1200" dirty="0">
-                <a:solidFill>
-                  <a:schemeClr val="tx1"/>
-                </a:solidFill>
-                <a:effectLst/>
-                <a:latin typeface="+mn-lt"/>
-                <a:ea typeface="+mn-ea"/>
-                <a:cs typeface="+mn-cs"/>
-              </a:rPr>
-              <a:t> </a:t>
-            </a:r>
-            <a:r>
-              <a:rPr lang="de-DE" sz="1200" b="0" i="0" u="none" strike="noStrike" kern="1200" dirty="0" err="1">
-                <a:solidFill>
-                  <a:schemeClr val="tx1"/>
-                </a:solidFill>
-                <a:effectLst/>
-                <a:latin typeface="+mn-lt"/>
-                <a:ea typeface="+mn-ea"/>
-                <a:cs typeface="+mn-cs"/>
-              </a:rPr>
-              <a:t>that</a:t>
-            </a:r>
-            <a:r>
-              <a:rPr lang="de-DE" sz="1200" b="0" i="0" u="none" strike="noStrike" kern="1200" dirty="0">
-                <a:solidFill>
-                  <a:schemeClr val="tx1"/>
-                </a:solidFill>
-                <a:effectLst/>
-                <a:latin typeface="+mn-lt"/>
-                <a:ea typeface="+mn-ea"/>
-                <a:cs typeface="+mn-cs"/>
-              </a:rPr>
-              <a:t> </a:t>
-            </a:r>
-            <a:r>
-              <a:rPr lang="de-DE" sz="1200" b="0" i="0" u="none" strike="noStrike" kern="1200" dirty="0" err="1">
-                <a:solidFill>
-                  <a:schemeClr val="tx1"/>
-                </a:solidFill>
-                <a:effectLst/>
-                <a:latin typeface="+mn-lt"/>
-                <a:ea typeface="+mn-ea"/>
-                <a:cs typeface="+mn-cs"/>
-              </a:rPr>
-              <a:t>the</a:t>
-            </a:r>
-            <a:r>
-              <a:rPr lang="de-DE" sz="1200" b="0" i="0" u="none" strike="noStrike" kern="1200" dirty="0">
-                <a:solidFill>
-                  <a:schemeClr val="tx1"/>
-                </a:solidFill>
-                <a:effectLst/>
-                <a:latin typeface="+mn-lt"/>
-                <a:ea typeface="+mn-ea"/>
-                <a:cs typeface="+mn-cs"/>
-              </a:rPr>
-              <a:t> </a:t>
-            </a:r>
-            <a:r>
-              <a:rPr lang="de-DE" sz="1200" b="0" i="0" u="none" strike="noStrike" kern="1200" dirty="0" err="1">
-                <a:solidFill>
-                  <a:schemeClr val="tx1"/>
-                </a:solidFill>
-                <a:effectLst/>
-                <a:latin typeface="+mn-lt"/>
-                <a:ea typeface="+mn-ea"/>
-                <a:cs typeface="+mn-cs"/>
-              </a:rPr>
-              <a:t>client</a:t>
-            </a:r>
-            <a:r>
-              <a:rPr lang="de-DE" sz="1200" b="0" i="0" u="none" strike="noStrike" kern="1200" dirty="0">
-                <a:solidFill>
-                  <a:schemeClr val="tx1"/>
-                </a:solidFill>
-                <a:effectLst/>
-                <a:latin typeface="+mn-lt"/>
-                <a:ea typeface="+mn-ea"/>
-                <a:cs typeface="+mn-cs"/>
-              </a:rPr>
-              <a:t> was </a:t>
-            </a:r>
-            <a:r>
-              <a:rPr lang="de-DE" sz="1200" b="0" i="0" u="none" strike="noStrike" kern="1200" dirty="0" err="1">
-                <a:solidFill>
-                  <a:schemeClr val="tx1"/>
-                </a:solidFill>
-                <a:effectLst/>
-                <a:latin typeface="+mn-lt"/>
-                <a:ea typeface="+mn-ea"/>
-                <a:cs typeface="+mn-cs"/>
-              </a:rPr>
-              <a:t>able</a:t>
-            </a:r>
-            <a:r>
-              <a:rPr lang="de-DE" sz="1200" b="0" i="0" u="none" strike="noStrike" kern="1200" dirty="0">
-                <a:solidFill>
-                  <a:schemeClr val="tx1"/>
-                </a:solidFill>
-                <a:effectLst/>
-                <a:latin typeface="+mn-lt"/>
-                <a:ea typeface="+mn-ea"/>
-                <a:cs typeface="+mn-cs"/>
-              </a:rPr>
-              <a:t> </a:t>
-            </a:r>
-            <a:r>
-              <a:rPr lang="de-DE" sz="1200" b="0" i="0" u="none" strike="noStrike" kern="1200" dirty="0" err="1">
-                <a:solidFill>
-                  <a:schemeClr val="tx1"/>
-                </a:solidFill>
-                <a:effectLst/>
-                <a:latin typeface="+mn-lt"/>
-                <a:ea typeface="+mn-ea"/>
-                <a:cs typeface="+mn-cs"/>
-              </a:rPr>
-              <a:t>to</a:t>
-            </a:r>
-            <a:r>
-              <a:rPr lang="de-DE" sz="1200" b="0" i="0" u="none" strike="noStrike" kern="1200" dirty="0">
-                <a:solidFill>
-                  <a:schemeClr val="tx1"/>
-                </a:solidFill>
-                <a:effectLst/>
-                <a:latin typeface="+mn-lt"/>
-                <a:ea typeface="+mn-ea"/>
-                <a:cs typeface="+mn-cs"/>
-              </a:rPr>
-              <a:t> </a:t>
-            </a:r>
-            <a:r>
-              <a:rPr lang="de-DE" sz="1200" b="0" i="0" u="none" strike="noStrike" kern="1200" dirty="0" err="1">
-                <a:solidFill>
-                  <a:schemeClr val="tx1"/>
-                </a:solidFill>
-                <a:effectLst/>
-                <a:latin typeface="+mn-lt"/>
-                <a:ea typeface="+mn-ea"/>
-                <a:cs typeface="+mn-cs"/>
-              </a:rPr>
-              <a:t>read</a:t>
-            </a:r>
-            <a:r>
-              <a:rPr lang="de-DE" sz="1200" b="0" i="0" u="none" strike="noStrike" kern="1200" dirty="0">
-                <a:solidFill>
-                  <a:schemeClr val="tx1"/>
-                </a:solidFill>
-                <a:effectLst/>
-                <a:latin typeface="+mn-lt"/>
-                <a:ea typeface="+mn-ea"/>
-                <a:cs typeface="+mn-cs"/>
-              </a:rPr>
-              <a:t> </a:t>
-            </a:r>
-            <a:r>
-              <a:rPr lang="de-DE" sz="1200" b="0" i="0" u="none" strike="noStrike" kern="1200" dirty="0" err="1">
-                <a:solidFill>
-                  <a:schemeClr val="tx1"/>
-                </a:solidFill>
-                <a:effectLst/>
-                <a:latin typeface="+mn-lt"/>
-                <a:ea typeface="+mn-ea"/>
-                <a:cs typeface="+mn-cs"/>
-              </a:rPr>
-              <a:t>it</a:t>
-            </a:r>
-            <a:r>
-              <a:rPr lang="de-DE" sz="1200" b="0" i="0" u="none" strike="noStrike" kern="1200" dirty="0">
-                <a:solidFill>
-                  <a:schemeClr val="tx1"/>
-                </a:solidFill>
-                <a:effectLst/>
-                <a:latin typeface="+mn-lt"/>
-                <a:ea typeface="+mn-ea"/>
-                <a:cs typeface="+mn-cs"/>
-              </a:rPr>
-              <a:t> </a:t>
-            </a:r>
-            <a:r>
-              <a:rPr lang="de-DE" sz="1200" b="0" i="0" u="none" strike="noStrike" kern="1200" dirty="0" err="1">
-                <a:solidFill>
-                  <a:schemeClr val="tx1"/>
-                </a:solidFill>
-                <a:effectLst/>
-                <a:latin typeface="+mn-lt"/>
-                <a:ea typeface="+mn-ea"/>
-                <a:cs typeface="+mn-cs"/>
-              </a:rPr>
-              <a:t>and</a:t>
-            </a:r>
-            <a:r>
-              <a:rPr lang="de-DE" sz="1200" b="0" i="0" u="none" strike="noStrike" kern="1200" dirty="0">
-                <a:solidFill>
-                  <a:schemeClr val="tx1"/>
-                </a:solidFill>
-                <a:effectLst/>
-                <a:latin typeface="+mn-lt"/>
-                <a:ea typeface="+mn-ea"/>
-                <a:cs typeface="+mn-cs"/>
-              </a:rPr>
-              <a:t> also </a:t>
-            </a:r>
-            <a:r>
-              <a:rPr lang="de-DE" sz="1200" b="0" i="0" u="none" strike="noStrike" kern="1200" dirty="0" err="1">
-                <a:solidFill>
-                  <a:schemeClr val="tx1"/>
-                </a:solidFill>
-                <a:effectLst/>
-                <a:latin typeface="+mn-lt"/>
-                <a:ea typeface="+mn-ea"/>
-                <a:cs typeface="+mn-cs"/>
-              </a:rPr>
-              <a:t>to</a:t>
-            </a:r>
-            <a:r>
-              <a:rPr lang="de-DE" sz="1200" b="0" i="0" u="none" strike="noStrike" kern="1200" dirty="0">
-                <a:solidFill>
-                  <a:schemeClr val="tx1"/>
-                </a:solidFill>
-                <a:effectLst/>
-                <a:latin typeface="+mn-lt"/>
-                <a:ea typeface="+mn-ea"/>
-                <a:cs typeface="+mn-cs"/>
-              </a:rPr>
-              <a:t> </a:t>
-            </a:r>
-            <a:r>
-              <a:rPr lang="de-DE" sz="1200" b="0" i="0" u="none" strike="noStrike" kern="1200" dirty="0" err="1">
-                <a:solidFill>
-                  <a:schemeClr val="tx1"/>
-                </a:solidFill>
-                <a:effectLst/>
-                <a:latin typeface="+mn-lt"/>
-                <a:ea typeface="+mn-ea"/>
-                <a:cs typeface="+mn-cs"/>
-              </a:rPr>
-              <a:t>separted</a:t>
-            </a:r>
-            <a:r>
-              <a:rPr lang="de-DE" sz="1200" b="0" i="0" u="none" strike="noStrike" kern="1200" dirty="0">
-                <a:solidFill>
-                  <a:schemeClr val="tx1"/>
-                </a:solidFill>
-                <a:effectLst/>
-                <a:latin typeface="+mn-lt"/>
-                <a:ea typeface="+mn-ea"/>
-                <a:cs typeface="+mn-cs"/>
-              </a:rPr>
-              <a:t> it.....</a:t>
-            </a:r>
-          </a:p>
-          <a:p>
-            <a:endParaRPr lang="de-DE" sz="1200" b="0" i="0" u="none" strike="noStrike" kern="1200" dirty="0">
-              <a:solidFill>
-                <a:schemeClr val="tx1"/>
-              </a:solidFill>
-              <a:effectLst/>
-              <a:latin typeface="+mn-lt"/>
-              <a:ea typeface="+mn-ea"/>
-              <a:cs typeface="+mn-cs"/>
-            </a:endParaRPr>
+            <a:endParaRPr lang="de-DE" dirty="0"/>
           </a:p>
         </p:txBody>
       </p:sp>
@@ -2485,7 +1009,7 @@
     </p:spTree>
     <p:extLst>
       <p:ext uri="{BB962C8B-B14F-4D97-AF65-F5344CB8AC3E}">
-        <p14:creationId xmlns:p14="http://schemas.microsoft.com/office/powerpoint/2010/main" val="69945829"/>
+        <p14:creationId xmlns:p14="http://schemas.microsoft.com/office/powerpoint/2010/main" val="950615522"/>
       </p:ext>
     </p:extLst>
   </p:cSld>
@@ -2539,7 +1063,1484 @@
           <a:bodyPr/>
           <a:lstStyle/>
           <a:p>
-            <a:endParaRPr lang="de-DE" dirty="0"/>
+            <a:r>
+              <a:rPr lang="de-DE" dirty="0"/>
+              <a:t>At </a:t>
+            </a:r>
+            <a:r>
+              <a:rPr lang="de-DE" dirty="0" err="1"/>
+              <a:t>the</a:t>
+            </a:r>
+            <a:r>
+              <a:rPr lang="de-DE" dirty="0"/>
+              <a:t> </a:t>
+            </a:r>
+            <a:r>
+              <a:rPr lang="de-DE" dirty="0" err="1"/>
+              <a:t>beginning</a:t>
+            </a:r>
+            <a:r>
+              <a:rPr lang="de-DE" dirty="0"/>
+              <a:t> </a:t>
+            </a:r>
+            <a:r>
+              <a:rPr lang="de-DE" dirty="0" err="1"/>
+              <a:t>of</a:t>
+            </a:r>
+            <a:r>
+              <a:rPr lang="de-DE" dirty="0"/>
+              <a:t> </a:t>
+            </a:r>
+            <a:r>
+              <a:rPr lang="de-DE" dirty="0" err="1"/>
+              <a:t>the</a:t>
+            </a:r>
+            <a:r>
+              <a:rPr lang="de-DE" dirty="0"/>
+              <a:t> </a:t>
+            </a:r>
+            <a:r>
+              <a:rPr lang="de-DE" dirty="0" err="1"/>
+              <a:t>Preparation</a:t>
+            </a:r>
+            <a:r>
+              <a:rPr lang="de-DE" dirty="0"/>
+              <a:t> Phase </a:t>
+            </a:r>
+            <a:r>
+              <a:rPr lang="de-DE" dirty="0" err="1"/>
+              <a:t>we</a:t>
+            </a:r>
+            <a:r>
+              <a:rPr lang="de-DE" dirty="0"/>
+              <a:t> </a:t>
+            </a:r>
+            <a:r>
+              <a:rPr lang="de-DE" dirty="0" err="1"/>
+              <a:t>had</a:t>
+            </a:r>
+            <a:r>
+              <a:rPr lang="de-DE" dirty="0"/>
+              <a:t> </a:t>
+            </a:r>
+            <a:r>
+              <a:rPr lang="de-DE" dirty="0" err="1"/>
+              <a:t>to</a:t>
+            </a:r>
+            <a:r>
+              <a:rPr lang="de-DE" dirty="0"/>
+              <a:t> </a:t>
+            </a:r>
+            <a:r>
+              <a:rPr lang="de-DE" dirty="0" err="1"/>
+              <a:t>knew</a:t>
+            </a:r>
+            <a:r>
+              <a:rPr lang="de-DE" dirty="0"/>
+              <a:t> </a:t>
+            </a:r>
+            <a:r>
+              <a:rPr lang="de-DE" dirty="0" err="1"/>
+              <a:t>which</a:t>
+            </a:r>
+            <a:r>
+              <a:rPr lang="de-DE" dirty="0"/>
+              <a:t> </a:t>
+            </a:r>
+            <a:r>
+              <a:rPr lang="de-DE" dirty="0" err="1"/>
+              <a:t>parameters</a:t>
+            </a:r>
+            <a:r>
+              <a:rPr lang="de-DE" dirty="0"/>
+              <a:t> </a:t>
+            </a:r>
+            <a:r>
+              <a:rPr lang="de-DE" dirty="0" err="1"/>
+              <a:t>are</a:t>
+            </a:r>
+            <a:r>
+              <a:rPr lang="de-DE" dirty="0"/>
+              <a:t> </a:t>
+            </a:r>
+            <a:r>
+              <a:rPr lang="de-DE" dirty="0" err="1"/>
+              <a:t>needed</a:t>
+            </a:r>
+            <a:r>
+              <a:rPr lang="de-DE" dirty="0"/>
+              <a:t>. </a:t>
+            </a:r>
+            <a:r>
+              <a:rPr lang="de-DE" dirty="0" err="1"/>
+              <a:t>We</a:t>
+            </a:r>
+            <a:r>
+              <a:rPr lang="de-DE" dirty="0"/>
+              <a:t> </a:t>
+            </a:r>
+            <a:r>
+              <a:rPr lang="de-DE" dirty="0" err="1"/>
+              <a:t>decided</a:t>
+            </a:r>
+            <a:r>
+              <a:rPr lang="de-DE" dirty="0"/>
+              <a:t> </a:t>
+            </a:r>
+            <a:r>
+              <a:rPr lang="de-DE" dirty="0" err="1"/>
+              <a:t>to</a:t>
+            </a:r>
+            <a:r>
+              <a:rPr lang="de-DE" dirty="0"/>
+              <a:t> </a:t>
+            </a:r>
+            <a:r>
+              <a:rPr lang="de-DE" dirty="0" err="1"/>
+              <a:t>take</a:t>
+            </a:r>
+            <a:r>
+              <a:rPr lang="de-DE" dirty="0"/>
+              <a:t> </a:t>
+            </a:r>
+            <a:r>
+              <a:rPr lang="de-DE" dirty="0" err="1"/>
+              <a:t>the</a:t>
+            </a:r>
+            <a:r>
+              <a:rPr lang="de-DE" dirty="0"/>
+              <a:t> </a:t>
+            </a:r>
+            <a:r>
+              <a:rPr lang="de-DE" dirty="0" err="1"/>
+              <a:t>Divison</a:t>
+            </a:r>
+            <a:r>
+              <a:rPr lang="de-DE" dirty="0"/>
+              <a:t>, Date </a:t>
+            </a:r>
+            <a:r>
+              <a:rPr lang="de-DE" dirty="0" err="1"/>
+              <a:t>HomeTeam</a:t>
+            </a:r>
+            <a:r>
+              <a:rPr lang="de-DE" dirty="0"/>
+              <a:t>, </a:t>
+            </a:r>
+            <a:r>
+              <a:rPr lang="de-DE" dirty="0" err="1"/>
+              <a:t>AwayTeam</a:t>
+            </a:r>
+            <a:r>
+              <a:rPr lang="de-DE" dirty="0"/>
+              <a:t>, </a:t>
+            </a:r>
+            <a:r>
+              <a:rPr lang="de-DE" dirty="0" err="1"/>
+              <a:t>Full</a:t>
+            </a:r>
+            <a:r>
+              <a:rPr lang="de-DE" dirty="0"/>
+              <a:t> Time </a:t>
+            </a:r>
+            <a:r>
+              <a:rPr lang="de-DE" dirty="0" err="1"/>
+              <a:t>Away</a:t>
+            </a:r>
+            <a:r>
+              <a:rPr lang="de-DE" dirty="0"/>
+              <a:t> Goals </a:t>
+            </a:r>
+            <a:r>
+              <a:rPr lang="de-DE" dirty="0" err="1"/>
+              <a:t>which</a:t>
+            </a:r>
+            <a:r>
+              <a:rPr lang="de-DE" dirty="0"/>
+              <a:t> </a:t>
+            </a:r>
+            <a:r>
+              <a:rPr lang="de-DE" dirty="0" err="1"/>
+              <a:t>means</a:t>
+            </a:r>
+            <a:r>
+              <a:rPr lang="de-DE" dirty="0"/>
+              <a:t>: </a:t>
+            </a:r>
+            <a:r>
+              <a:rPr lang="de-DE" dirty="0" err="1"/>
+              <a:t>and</a:t>
+            </a:r>
+            <a:r>
+              <a:rPr lang="de-DE" dirty="0"/>
+              <a:t> </a:t>
+            </a:r>
+            <a:r>
+              <a:rPr lang="de-DE" dirty="0" err="1"/>
+              <a:t>Full</a:t>
+            </a:r>
+            <a:r>
+              <a:rPr lang="de-DE" dirty="0"/>
+              <a:t> Time Home Goals, </a:t>
+            </a:r>
+            <a:r>
+              <a:rPr lang="de-DE" sz="1200" b="0" i="0" u="none" strike="noStrike" kern="1200" dirty="0" err="1">
+                <a:solidFill>
+                  <a:schemeClr val="tx1"/>
+                </a:solidFill>
+                <a:effectLst/>
+                <a:latin typeface="+mn-lt"/>
+                <a:ea typeface="+mn-ea"/>
+                <a:cs typeface="+mn-cs"/>
+              </a:rPr>
+              <a:t>Full</a:t>
+            </a:r>
+            <a:r>
+              <a:rPr lang="de-DE" sz="1200" b="0" i="0" u="none" strike="noStrike" kern="1200" dirty="0">
+                <a:solidFill>
+                  <a:schemeClr val="tx1"/>
+                </a:solidFill>
+                <a:effectLst/>
+                <a:latin typeface="+mn-lt"/>
+                <a:ea typeface="+mn-ea"/>
+                <a:cs typeface="+mn-cs"/>
+              </a:rPr>
+              <a:t> Time </a:t>
+            </a:r>
+            <a:r>
+              <a:rPr lang="de-DE" sz="1200" b="0" i="0" u="none" strike="noStrike" kern="1200" dirty="0" err="1">
+                <a:solidFill>
+                  <a:schemeClr val="tx1"/>
+                </a:solidFill>
+                <a:effectLst/>
+                <a:latin typeface="+mn-lt"/>
+                <a:ea typeface="+mn-ea"/>
+                <a:cs typeface="+mn-cs"/>
+              </a:rPr>
+              <a:t>Result</a:t>
+            </a:r>
+            <a:r>
+              <a:rPr lang="de-DE" sz="1200" b="0" i="0" u="none" strike="noStrike" kern="1200" dirty="0">
+                <a:solidFill>
+                  <a:schemeClr val="tx1"/>
+                </a:solidFill>
+                <a:effectLst/>
+                <a:latin typeface="+mn-lt"/>
+                <a:ea typeface="+mn-ea"/>
+                <a:cs typeface="+mn-cs"/>
+              </a:rPr>
+              <a:t> (H=Home </a:t>
+            </a:r>
+            <a:r>
+              <a:rPr lang="de-DE" sz="1200" b="0" i="0" u="none" strike="noStrike" kern="1200" dirty="0" err="1">
+                <a:solidFill>
+                  <a:schemeClr val="tx1"/>
+                </a:solidFill>
+                <a:effectLst/>
+                <a:latin typeface="+mn-lt"/>
+                <a:ea typeface="+mn-ea"/>
+                <a:cs typeface="+mn-cs"/>
+              </a:rPr>
+              <a:t>Win</a:t>
+            </a:r>
+            <a:r>
+              <a:rPr lang="de-DE" sz="1200" b="0" i="0" u="none" strike="noStrike" kern="1200" dirty="0">
+                <a:solidFill>
+                  <a:schemeClr val="tx1"/>
+                </a:solidFill>
+                <a:effectLst/>
+                <a:latin typeface="+mn-lt"/>
+                <a:ea typeface="+mn-ea"/>
+                <a:cs typeface="+mn-cs"/>
+              </a:rPr>
+              <a:t>, D=Draw, A=</a:t>
+            </a:r>
+            <a:r>
+              <a:rPr lang="de-DE" sz="1200" b="0" i="0" u="none" strike="noStrike" kern="1200" dirty="0" err="1">
+                <a:solidFill>
+                  <a:schemeClr val="tx1"/>
+                </a:solidFill>
+                <a:effectLst/>
+                <a:latin typeface="+mn-lt"/>
+                <a:ea typeface="+mn-ea"/>
+                <a:cs typeface="+mn-cs"/>
+              </a:rPr>
+              <a:t>Away</a:t>
+            </a:r>
+            <a:r>
+              <a:rPr lang="de-DE" sz="1200" b="0" i="0" u="none" strike="noStrike" kern="1200" dirty="0">
+                <a:solidFill>
+                  <a:schemeClr val="tx1"/>
+                </a:solidFill>
+                <a:effectLst/>
+                <a:latin typeface="+mn-lt"/>
+                <a:ea typeface="+mn-ea"/>
+                <a:cs typeface="+mn-cs"/>
+              </a:rPr>
+              <a:t> </a:t>
+            </a:r>
+            <a:r>
+              <a:rPr lang="de-DE" sz="1200" b="0" i="0" u="none" strike="noStrike" kern="1200" dirty="0" err="1">
+                <a:solidFill>
+                  <a:schemeClr val="tx1"/>
+                </a:solidFill>
+                <a:effectLst/>
+                <a:latin typeface="+mn-lt"/>
+                <a:ea typeface="+mn-ea"/>
+                <a:cs typeface="+mn-cs"/>
+              </a:rPr>
+              <a:t>Win</a:t>
+            </a:r>
+            <a:r>
+              <a:rPr lang="de-DE" sz="1200" b="0" i="0" u="none" strike="noStrike" kern="1200" dirty="0">
+                <a:solidFill>
+                  <a:schemeClr val="tx1"/>
+                </a:solidFill>
+                <a:effectLst/>
+                <a:latin typeface="+mn-lt"/>
+                <a:ea typeface="+mn-ea"/>
+                <a:cs typeface="+mn-cs"/>
+              </a:rPr>
+              <a:t>)....</a:t>
+            </a:r>
+          </a:p>
+          <a:p>
+            <a:endParaRPr lang="de-DE" sz="1200" b="0" i="0" u="none" strike="noStrike" kern="1200" dirty="0">
+              <a:solidFill>
+                <a:schemeClr val="tx1"/>
+              </a:solidFill>
+              <a:effectLst/>
+              <a:latin typeface="+mn-lt"/>
+              <a:ea typeface="+mn-ea"/>
+              <a:cs typeface="+mn-cs"/>
+            </a:endParaRPr>
+          </a:p>
+          <a:p>
+            <a:r>
+              <a:rPr lang="de-DE" sz="1200" b="0" i="0" u="none" strike="noStrike" kern="1200" dirty="0">
+                <a:solidFill>
+                  <a:schemeClr val="tx1"/>
+                </a:solidFill>
+                <a:effectLst/>
+                <a:latin typeface="+mn-lt"/>
+                <a:ea typeface="+mn-ea"/>
+                <a:cs typeface="+mn-cs"/>
+              </a:rPr>
+              <a:t>I </a:t>
+            </a:r>
+            <a:r>
+              <a:rPr lang="de-DE" sz="1200" b="0" i="0" u="none" strike="noStrike" kern="1200" dirty="0" err="1">
+                <a:solidFill>
+                  <a:schemeClr val="tx1"/>
+                </a:solidFill>
+                <a:effectLst/>
+                <a:latin typeface="+mn-lt"/>
+                <a:ea typeface="+mn-ea"/>
+                <a:cs typeface="+mn-cs"/>
+              </a:rPr>
+              <a:t>did</a:t>
+            </a:r>
+            <a:r>
+              <a:rPr lang="de-DE" sz="1200" b="0" i="0" u="none" strike="noStrike" kern="1200" dirty="0">
+                <a:solidFill>
+                  <a:schemeClr val="tx1"/>
+                </a:solidFill>
+                <a:effectLst/>
+                <a:latin typeface="+mn-lt"/>
+                <a:ea typeface="+mn-ea"/>
+                <a:cs typeface="+mn-cs"/>
+              </a:rPr>
+              <a:t> </a:t>
+            </a:r>
+            <a:r>
+              <a:rPr lang="de-DE" sz="1200" b="0" i="0" u="none" strike="noStrike" kern="1200" dirty="0" err="1">
+                <a:solidFill>
+                  <a:schemeClr val="tx1"/>
+                </a:solidFill>
+                <a:effectLst/>
+                <a:latin typeface="+mn-lt"/>
+                <a:ea typeface="+mn-ea"/>
+                <a:cs typeface="+mn-cs"/>
+              </a:rPr>
+              <a:t>this</a:t>
+            </a:r>
+            <a:r>
+              <a:rPr lang="de-DE" sz="1200" b="0" i="0" u="none" strike="noStrike" kern="1200" dirty="0">
+                <a:solidFill>
+                  <a:schemeClr val="tx1"/>
+                </a:solidFill>
+                <a:effectLst/>
+                <a:latin typeface="+mn-lt"/>
+                <a:ea typeface="+mn-ea"/>
+                <a:cs typeface="+mn-cs"/>
+              </a:rPr>
+              <a:t> </a:t>
+            </a:r>
+            <a:r>
+              <a:rPr lang="de-DE" sz="1200" b="0" i="0" u="none" strike="noStrike" kern="1200" dirty="0" err="1">
+                <a:solidFill>
+                  <a:schemeClr val="tx1"/>
+                </a:solidFill>
+                <a:effectLst/>
+                <a:latin typeface="+mn-lt"/>
+                <a:ea typeface="+mn-ea"/>
+                <a:cs typeface="+mn-cs"/>
+              </a:rPr>
+              <a:t>first</a:t>
+            </a:r>
+            <a:r>
+              <a:rPr lang="de-DE" sz="1200" b="0" i="0" u="none" strike="noStrike" kern="1200" dirty="0">
+                <a:solidFill>
+                  <a:schemeClr val="tx1"/>
+                </a:solidFill>
+                <a:effectLst/>
+                <a:latin typeface="+mn-lt"/>
+                <a:ea typeface="+mn-ea"/>
+                <a:cs typeface="+mn-cs"/>
+              </a:rPr>
+              <a:t> </a:t>
+            </a:r>
+            <a:r>
+              <a:rPr lang="de-DE" sz="1200" b="0" i="0" u="none" strike="noStrike" kern="1200" dirty="0" err="1">
+                <a:solidFill>
+                  <a:schemeClr val="tx1"/>
+                </a:solidFill>
+                <a:effectLst/>
+                <a:latin typeface="+mn-lt"/>
+                <a:ea typeface="+mn-ea"/>
+                <a:cs typeface="+mn-cs"/>
+              </a:rPr>
+              <a:t>cleaning</a:t>
+            </a:r>
+            <a:r>
+              <a:rPr lang="de-DE" sz="1200" b="0" i="0" u="none" strike="noStrike" kern="1200" dirty="0">
+                <a:solidFill>
+                  <a:schemeClr val="tx1"/>
+                </a:solidFill>
+                <a:effectLst/>
+                <a:latin typeface="+mn-lt"/>
+                <a:ea typeface="+mn-ea"/>
+                <a:cs typeface="+mn-cs"/>
+              </a:rPr>
+              <a:t> </a:t>
+            </a:r>
+            <a:r>
+              <a:rPr lang="de-DE" sz="1200" b="0" i="0" u="none" strike="noStrike" kern="1200" dirty="0" err="1">
+                <a:solidFill>
+                  <a:schemeClr val="tx1"/>
+                </a:solidFill>
+                <a:effectLst/>
+                <a:latin typeface="+mn-lt"/>
+                <a:ea typeface="+mn-ea"/>
+                <a:cs typeface="+mn-cs"/>
+              </a:rPr>
+              <a:t>step</a:t>
+            </a:r>
+            <a:r>
+              <a:rPr lang="de-DE" sz="1200" b="0" i="0" u="none" strike="noStrike" kern="1200" dirty="0">
+                <a:solidFill>
+                  <a:schemeClr val="tx1"/>
+                </a:solidFill>
+                <a:effectLst/>
+                <a:latin typeface="+mn-lt"/>
+                <a:ea typeface="+mn-ea"/>
+                <a:cs typeface="+mn-cs"/>
+              </a:rPr>
+              <a:t> in Excel </a:t>
+            </a:r>
+            <a:r>
+              <a:rPr lang="de-DE" sz="1200" b="0" i="0" u="none" strike="noStrike" kern="1200" dirty="0" err="1">
+                <a:solidFill>
+                  <a:schemeClr val="tx1"/>
+                </a:solidFill>
+                <a:effectLst/>
+                <a:latin typeface="+mn-lt"/>
+                <a:ea typeface="+mn-ea"/>
+                <a:cs typeface="+mn-cs"/>
+              </a:rPr>
+              <a:t>and</a:t>
+            </a:r>
+            <a:r>
+              <a:rPr lang="de-DE" sz="1200" b="0" i="0" u="none" strike="noStrike" kern="1200" dirty="0">
+                <a:solidFill>
+                  <a:schemeClr val="tx1"/>
+                </a:solidFill>
+                <a:effectLst/>
+                <a:latin typeface="+mn-lt"/>
+                <a:ea typeface="+mn-ea"/>
+                <a:cs typeface="+mn-cs"/>
+              </a:rPr>
+              <a:t> </a:t>
+            </a:r>
+            <a:r>
+              <a:rPr lang="de-DE" sz="1200" b="0" i="0" u="none" strike="noStrike" kern="1200" dirty="0" err="1">
+                <a:solidFill>
+                  <a:schemeClr val="tx1"/>
+                </a:solidFill>
+                <a:effectLst/>
+                <a:latin typeface="+mn-lt"/>
+                <a:ea typeface="+mn-ea"/>
+                <a:cs typeface="+mn-cs"/>
+              </a:rPr>
+              <a:t>first</a:t>
+            </a:r>
+            <a:r>
+              <a:rPr lang="de-DE" sz="1200" b="0" i="0" u="none" strike="noStrike" kern="1200" dirty="0">
+                <a:solidFill>
+                  <a:schemeClr val="tx1"/>
+                </a:solidFill>
+                <a:effectLst/>
+                <a:latin typeface="+mn-lt"/>
+                <a:ea typeface="+mn-ea"/>
+                <a:cs typeface="+mn-cs"/>
+              </a:rPr>
+              <a:t> </a:t>
+            </a:r>
+            <a:r>
+              <a:rPr lang="de-DE" sz="1200" b="0" i="0" u="none" strike="noStrike" kern="1200" dirty="0" err="1">
+                <a:solidFill>
+                  <a:schemeClr val="tx1"/>
+                </a:solidFill>
+                <a:effectLst/>
+                <a:latin typeface="+mn-lt"/>
+                <a:ea typeface="+mn-ea"/>
+                <a:cs typeface="+mn-cs"/>
+              </a:rPr>
+              <a:t>seperated</a:t>
+            </a:r>
+            <a:r>
+              <a:rPr lang="de-DE" sz="1200" b="0" i="0" u="none" strike="noStrike" kern="1200" dirty="0">
+                <a:solidFill>
+                  <a:schemeClr val="tx1"/>
+                </a:solidFill>
+                <a:effectLst/>
+                <a:latin typeface="+mn-lt"/>
+                <a:ea typeface="+mn-ea"/>
+                <a:cs typeface="+mn-cs"/>
+              </a:rPr>
+              <a:t> all </a:t>
+            </a:r>
+            <a:r>
+              <a:rPr lang="de-DE" sz="1200" b="0" i="0" u="none" strike="noStrike" kern="1200" dirty="0" err="1">
+                <a:solidFill>
+                  <a:schemeClr val="tx1"/>
+                </a:solidFill>
+                <a:effectLst/>
+                <a:latin typeface="+mn-lt"/>
+                <a:ea typeface="+mn-ea"/>
+                <a:cs typeface="+mn-cs"/>
+              </a:rPr>
+              <a:t>the</a:t>
+            </a:r>
+            <a:r>
+              <a:rPr lang="de-DE" sz="1200" b="0" i="0" u="none" strike="noStrike" kern="1200" dirty="0">
+                <a:solidFill>
+                  <a:schemeClr val="tx1"/>
+                </a:solidFill>
+                <a:effectLst/>
+                <a:latin typeface="+mn-lt"/>
+                <a:ea typeface="+mn-ea"/>
+                <a:cs typeface="+mn-cs"/>
+              </a:rPr>
+              <a:t> </a:t>
+            </a:r>
+            <a:r>
+              <a:rPr lang="de-DE" sz="1200" b="0" i="0" u="none" strike="noStrike" kern="1200" dirty="0" err="1">
+                <a:solidFill>
+                  <a:schemeClr val="tx1"/>
+                </a:solidFill>
+                <a:effectLst/>
+                <a:latin typeface="+mn-lt"/>
+                <a:ea typeface="+mn-ea"/>
+                <a:cs typeface="+mn-cs"/>
+              </a:rPr>
+              <a:t>parameter</a:t>
+            </a:r>
+            <a:r>
+              <a:rPr lang="de-DE" sz="1200" b="0" i="0" u="none" strike="noStrike" kern="1200" dirty="0">
+                <a:solidFill>
+                  <a:schemeClr val="tx1"/>
+                </a:solidFill>
+                <a:effectLst/>
+                <a:latin typeface="+mn-lt"/>
+                <a:ea typeface="+mn-ea"/>
+                <a:cs typeface="+mn-cs"/>
+              </a:rPr>
+              <a:t> in </a:t>
+            </a:r>
+            <a:r>
+              <a:rPr lang="de-DE" sz="1200" b="0" i="0" u="none" strike="noStrike" kern="1200" dirty="0" err="1">
+                <a:solidFill>
+                  <a:schemeClr val="tx1"/>
+                </a:solidFill>
+                <a:effectLst/>
+                <a:latin typeface="+mn-lt"/>
+                <a:ea typeface="+mn-ea"/>
+                <a:cs typeface="+mn-cs"/>
+              </a:rPr>
+              <a:t>diffrent</a:t>
+            </a:r>
+            <a:r>
+              <a:rPr lang="de-DE" sz="1200" b="0" i="0" u="none" strike="noStrike" kern="1200" dirty="0">
+                <a:solidFill>
+                  <a:schemeClr val="tx1"/>
+                </a:solidFill>
+                <a:effectLst/>
+                <a:latin typeface="+mn-lt"/>
+                <a:ea typeface="+mn-ea"/>
+                <a:cs typeface="+mn-cs"/>
+              </a:rPr>
+              <a:t> </a:t>
+            </a:r>
+            <a:r>
+              <a:rPr lang="de-DE" sz="1200" b="0" i="0" u="none" strike="noStrike" kern="1200" dirty="0" err="1">
+                <a:solidFill>
+                  <a:schemeClr val="tx1"/>
+                </a:solidFill>
+                <a:effectLst/>
+                <a:latin typeface="+mn-lt"/>
+                <a:ea typeface="+mn-ea"/>
+                <a:cs typeface="+mn-cs"/>
+              </a:rPr>
+              <a:t>columns</a:t>
+            </a:r>
+            <a:r>
+              <a:rPr lang="de-DE" sz="1200" b="0" i="0" u="none" strike="noStrike" kern="1200" dirty="0">
+                <a:solidFill>
+                  <a:schemeClr val="tx1"/>
+                </a:solidFill>
+                <a:effectLst/>
+                <a:latin typeface="+mn-lt"/>
+                <a:ea typeface="+mn-ea"/>
+                <a:cs typeface="+mn-cs"/>
+              </a:rPr>
+              <a:t>.... After </a:t>
+            </a:r>
+            <a:r>
+              <a:rPr lang="de-DE" sz="1200" b="0" i="0" u="none" strike="noStrike" kern="1200" dirty="0" err="1">
+                <a:solidFill>
+                  <a:schemeClr val="tx1"/>
+                </a:solidFill>
+                <a:effectLst/>
+                <a:latin typeface="+mn-lt"/>
+                <a:ea typeface="+mn-ea"/>
+                <a:cs typeface="+mn-cs"/>
+              </a:rPr>
+              <a:t>that</a:t>
+            </a:r>
+            <a:r>
+              <a:rPr lang="de-DE" sz="1200" b="0" i="0" u="none" strike="noStrike" kern="1200" dirty="0">
+                <a:solidFill>
+                  <a:schemeClr val="tx1"/>
+                </a:solidFill>
+                <a:effectLst/>
+                <a:latin typeface="+mn-lt"/>
+                <a:ea typeface="+mn-ea"/>
+                <a:cs typeface="+mn-cs"/>
+              </a:rPr>
+              <a:t> I </a:t>
+            </a:r>
+            <a:r>
+              <a:rPr lang="de-DE" sz="1200" b="0" i="0" u="none" strike="noStrike" kern="1200" dirty="0" err="1">
+                <a:solidFill>
+                  <a:schemeClr val="tx1"/>
+                </a:solidFill>
+                <a:effectLst/>
+                <a:latin typeface="+mn-lt"/>
+                <a:ea typeface="+mn-ea"/>
+                <a:cs typeface="+mn-cs"/>
+              </a:rPr>
+              <a:t>deleted</a:t>
+            </a:r>
+            <a:r>
+              <a:rPr lang="de-DE" sz="1200" b="0" i="0" u="none" strike="noStrike" kern="1200" dirty="0">
+                <a:solidFill>
+                  <a:schemeClr val="tx1"/>
+                </a:solidFill>
+                <a:effectLst/>
+                <a:latin typeface="+mn-lt"/>
+                <a:ea typeface="+mn-ea"/>
+                <a:cs typeface="+mn-cs"/>
+              </a:rPr>
+              <a:t> </a:t>
+            </a:r>
+            <a:r>
+              <a:rPr lang="de-DE" sz="1200" b="0" i="0" u="none" strike="noStrike" kern="1200" dirty="0" err="1">
+                <a:solidFill>
+                  <a:schemeClr val="tx1"/>
+                </a:solidFill>
+                <a:effectLst/>
+                <a:latin typeface="+mn-lt"/>
+                <a:ea typeface="+mn-ea"/>
+                <a:cs typeface="+mn-cs"/>
+              </a:rPr>
+              <a:t>the</a:t>
+            </a:r>
+            <a:r>
+              <a:rPr lang="de-DE" sz="1200" b="0" i="0" u="none" strike="noStrike" kern="1200" dirty="0">
+                <a:solidFill>
+                  <a:schemeClr val="tx1"/>
+                </a:solidFill>
+                <a:effectLst/>
+                <a:latin typeface="+mn-lt"/>
+                <a:ea typeface="+mn-ea"/>
+                <a:cs typeface="+mn-cs"/>
+              </a:rPr>
+              <a:t> not </a:t>
+            </a:r>
+            <a:r>
+              <a:rPr lang="de-DE" sz="1200" b="0" i="0" u="none" strike="noStrike" kern="1200" dirty="0" err="1">
+                <a:solidFill>
+                  <a:schemeClr val="tx1"/>
+                </a:solidFill>
+                <a:effectLst/>
+                <a:latin typeface="+mn-lt"/>
+                <a:ea typeface="+mn-ea"/>
+                <a:cs typeface="+mn-cs"/>
+              </a:rPr>
+              <a:t>needed</a:t>
+            </a:r>
+            <a:r>
+              <a:rPr lang="de-DE" sz="1200" b="0" i="0" u="none" strike="noStrike" kern="1200" dirty="0">
+                <a:solidFill>
+                  <a:schemeClr val="tx1"/>
+                </a:solidFill>
+                <a:effectLst/>
+                <a:latin typeface="+mn-lt"/>
+                <a:ea typeface="+mn-ea"/>
+                <a:cs typeface="+mn-cs"/>
+              </a:rPr>
+              <a:t> </a:t>
+            </a:r>
+            <a:r>
+              <a:rPr lang="de-DE" sz="1200" b="0" i="0" u="none" strike="noStrike" kern="1200" dirty="0" err="1">
+                <a:solidFill>
+                  <a:schemeClr val="tx1"/>
+                </a:solidFill>
+                <a:effectLst/>
+                <a:latin typeface="+mn-lt"/>
+                <a:ea typeface="+mn-ea"/>
+                <a:cs typeface="+mn-cs"/>
+              </a:rPr>
+              <a:t>columns</a:t>
+            </a:r>
+            <a:r>
+              <a:rPr lang="de-DE" sz="1200" b="0" i="0" u="none" strike="noStrike" kern="1200" dirty="0">
+                <a:solidFill>
+                  <a:schemeClr val="tx1"/>
+                </a:solidFill>
+                <a:effectLst/>
+                <a:latin typeface="+mn-lt"/>
+                <a:ea typeface="+mn-ea"/>
+                <a:cs typeface="+mn-cs"/>
+              </a:rPr>
+              <a:t>....</a:t>
+            </a:r>
+            <a:r>
+              <a:rPr lang="de-DE" sz="1200" b="0" i="0" u="none" strike="noStrike" kern="1200" dirty="0" err="1">
+                <a:solidFill>
+                  <a:schemeClr val="tx1"/>
+                </a:solidFill>
+                <a:effectLst/>
+                <a:latin typeface="+mn-lt"/>
+                <a:ea typeface="+mn-ea"/>
+                <a:cs typeface="+mn-cs"/>
+              </a:rPr>
+              <a:t>for</a:t>
+            </a:r>
+            <a:r>
+              <a:rPr lang="de-DE" sz="1200" b="0" i="0" u="none" strike="noStrike" kern="1200" dirty="0">
+                <a:solidFill>
+                  <a:schemeClr val="tx1"/>
+                </a:solidFill>
+                <a:effectLst/>
+                <a:latin typeface="+mn-lt"/>
+                <a:ea typeface="+mn-ea"/>
+                <a:cs typeface="+mn-cs"/>
+              </a:rPr>
+              <a:t> </a:t>
+            </a:r>
+            <a:r>
+              <a:rPr lang="de-DE" sz="1200" b="0" i="0" u="none" strike="noStrike" kern="1200" dirty="0" err="1">
+                <a:solidFill>
+                  <a:schemeClr val="tx1"/>
+                </a:solidFill>
+                <a:effectLst/>
+                <a:latin typeface="+mn-lt"/>
+                <a:ea typeface="+mn-ea"/>
+                <a:cs typeface="+mn-cs"/>
+              </a:rPr>
+              <a:t>each</a:t>
+            </a:r>
+            <a:r>
+              <a:rPr lang="de-DE" sz="1200" b="0" i="0" u="none" strike="noStrike" kern="1200" dirty="0">
+                <a:solidFill>
+                  <a:schemeClr val="tx1"/>
+                </a:solidFill>
+                <a:effectLst/>
+                <a:latin typeface="+mn-lt"/>
+                <a:ea typeface="+mn-ea"/>
+                <a:cs typeface="+mn-cs"/>
+              </a:rPr>
+              <a:t> </a:t>
+            </a:r>
+            <a:r>
+              <a:rPr lang="de-DE" sz="1200" b="0" i="0" u="none" strike="noStrike" kern="1200" dirty="0" err="1">
+                <a:solidFill>
+                  <a:schemeClr val="tx1"/>
+                </a:solidFill>
+                <a:effectLst/>
+                <a:latin typeface="+mn-lt"/>
+                <a:ea typeface="+mn-ea"/>
+                <a:cs typeface="+mn-cs"/>
+              </a:rPr>
+              <a:t>season</a:t>
+            </a:r>
+            <a:endParaRPr lang="de-DE" sz="1200" b="0" i="0" u="none" strike="noStrike" kern="1200" dirty="0">
+              <a:solidFill>
+                <a:schemeClr val="tx1"/>
+              </a:solidFill>
+              <a:effectLst/>
+              <a:latin typeface="+mn-lt"/>
+              <a:ea typeface="+mn-ea"/>
+              <a:cs typeface="+mn-cs"/>
+            </a:endParaRPr>
+          </a:p>
+          <a:p>
+            <a:endParaRPr lang="de-DE" sz="1200" b="0" i="0" u="none" strike="noStrike" kern="1200" dirty="0">
+              <a:solidFill>
+                <a:schemeClr val="tx1"/>
+              </a:solidFill>
+              <a:effectLst/>
+              <a:latin typeface="+mn-lt"/>
+              <a:ea typeface="+mn-ea"/>
+              <a:cs typeface="+mn-cs"/>
+            </a:endParaRPr>
+          </a:p>
+          <a:p>
+            <a:r>
+              <a:rPr lang="de-DE" sz="1200" b="0" i="0" u="none" strike="noStrike" kern="1200" dirty="0">
+                <a:solidFill>
+                  <a:schemeClr val="tx1"/>
+                </a:solidFill>
+                <a:effectLst/>
+                <a:latin typeface="+mn-lt"/>
+                <a:ea typeface="+mn-ea"/>
+                <a:cs typeface="+mn-cs"/>
+              </a:rPr>
+              <a:t>Next </a:t>
+            </a:r>
+            <a:r>
+              <a:rPr lang="de-DE" sz="1200" b="0" i="0" u="none" strike="noStrike" kern="1200" dirty="0" err="1">
+                <a:solidFill>
+                  <a:schemeClr val="tx1"/>
+                </a:solidFill>
+                <a:effectLst/>
+                <a:latin typeface="+mn-lt"/>
+                <a:ea typeface="+mn-ea"/>
+                <a:cs typeface="+mn-cs"/>
+              </a:rPr>
+              <a:t>step</a:t>
+            </a:r>
+            <a:r>
+              <a:rPr lang="de-DE" sz="1200" b="0" i="0" u="none" strike="noStrike" kern="1200" dirty="0">
+                <a:solidFill>
+                  <a:schemeClr val="tx1"/>
+                </a:solidFill>
+                <a:effectLst/>
+                <a:latin typeface="+mn-lt"/>
+                <a:ea typeface="+mn-ea"/>
+                <a:cs typeface="+mn-cs"/>
+              </a:rPr>
+              <a:t> was </a:t>
+            </a:r>
+            <a:r>
+              <a:rPr lang="de-DE" sz="1200" b="0" i="0" u="none" strike="noStrike" kern="1200" dirty="0" err="1">
+                <a:solidFill>
+                  <a:schemeClr val="tx1"/>
+                </a:solidFill>
+                <a:effectLst/>
+                <a:latin typeface="+mn-lt"/>
+                <a:ea typeface="+mn-ea"/>
+                <a:cs typeface="+mn-cs"/>
+              </a:rPr>
+              <a:t>to</a:t>
+            </a:r>
+            <a:r>
+              <a:rPr lang="de-DE" sz="1200" b="0" i="0" u="none" strike="noStrike" kern="1200" dirty="0">
+                <a:solidFill>
+                  <a:schemeClr val="tx1"/>
+                </a:solidFill>
+                <a:effectLst/>
+                <a:latin typeface="+mn-lt"/>
+                <a:ea typeface="+mn-ea"/>
+                <a:cs typeface="+mn-cs"/>
+              </a:rPr>
+              <a:t> </a:t>
+            </a:r>
+            <a:r>
+              <a:rPr lang="de-DE" sz="1200" b="0" i="0" u="none" strike="noStrike" kern="1200" dirty="0" err="1">
+                <a:solidFill>
+                  <a:schemeClr val="tx1"/>
+                </a:solidFill>
+                <a:effectLst/>
+                <a:latin typeface="+mn-lt"/>
+                <a:ea typeface="+mn-ea"/>
+                <a:cs typeface="+mn-cs"/>
+              </a:rPr>
+              <a:t>put</a:t>
+            </a:r>
+            <a:r>
+              <a:rPr lang="de-DE" sz="1200" b="0" i="0" u="none" strike="noStrike" kern="1200" dirty="0">
+                <a:solidFill>
+                  <a:schemeClr val="tx1"/>
+                </a:solidFill>
+                <a:effectLst/>
+                <a:latin typeface="+mn-lt"/>
+                <a:ea typeface="+mn-ea"/>
+                <a:cs typeface="+mn-cs"/>
+              </a:rPr>
+              <a:t> </a:t>
+            </a:r>
+            <a:r>
+              <a:rPr lang="de-DE" sz="1200" b="0" i="0" u="none" strike="noStrike" kern="1200" dirty="0" err="1">
+                <a:solidFill>
+                  <a:schemeClr val="tx1"/>
+                </a:solidFill>
+                <a:effectLst/>
+                <a:latin typeface="+mn-lt"/>
+                <a:ea typeface="+mn-ea"/>
+                <a:cs typeface="+mn-cs"/>
+              </a:rPr>
+              <a:t>this</a:t>
+            </a:r>
+            <a:r>
+              <a:rPr lang="de-DE" sz="1200" b="0" i="0" u="none" strike="noStrike" kern="1200" dirty="0">
+                <a:solidFill>
+                  <a:schemeClr val="tx1"/>
+                </a:solidFill>
+                <a:effectLst/>
+                <a:latin typeface="+mn-lt"/>
+                <a:ea typeface="+mn-ea"/>
+                <a:cs typeface="+mn-cs"/>
+              </a:rPr>
+              <a:t> </a:t>
+            </a:r>
+            <a:r>
+              <a:rPr lang="de-DE" sz="1200" b="0" i="0" u="none" strike="noStrike" kern="1200" dirty="0" err="1">
+                <a:solidFill>
+                  <a:schemeClr val="tx1"/>
+                </a:solidFill>
+                <a:effectLst/>
+                <a:latin typeface="+mn-lt"/>
+                <a:ea typeface="+mn-ea"/>
+                <a:cs typeface="+mn-cs"/>
+              </a:rPr>
+              <a:t>data</a:t>
+            </a:r>
+            <a:r>
+              <a:rPr lang="de-DE" sz="1200" b="0" i="0" u="none" strike="noStrike" kern="1200" dirty="0">
+                <a:solidFill>
+                  <a:schemeClr val="tx1"/>
+                </a:solidFill>
+                <a:effectLst/>
+                <a:latin typeface="+mn-lt"/>
+                <a:ea typeface="+mn-ea"/>
+                <a:cs typeface="+mn-cs"/>
+              </a:rPr>
+              <a:t> via </a:t>
+            </a:r>
+            <a:r>
+              <a:rPr lang="de-DE" sz="1200" b="0" i="0" u="none" strike="noStrike" kern="1200" dirty="0" err="1">
+                <a:solidFill>
+                  <a:schemeClr val="tx1"/>
+                </a:solidFill>
+                <a:effectLst/>
+                <a:latin typeface="+mn-lt"/>
+                <a:ea typeface="+mn-ea"/>
+                <a:cs typeface="+mn-cs"/>
+              </a:rPr>
+              <a:t>phpmyadmin</a:t>
+            </a:r>
+            <a:r>
+              <a:rPr lang="de-DE" sz="1200" b="0" i="0" u="none" strike="noStrike" kern="1200" dirty="0">
+                <a:solidFill>
+                  <a:schemeClr val="tx1"/>
+                </a:solidFill>
+                <a:effectLst/>
+                <a:latin typeface="+mn-lt"/>
+                <a:ea typeface="+mn-ea"/>
+                <a:cs typeface="+mn-cs"/>
+              </a:rPr>
+              <a:t> </a:t>
+            </a:r>
+            <a:r>
+              <a:rPr lang="de-DE" sz="1200" b="0" i="0" u="none" strike="noStrike" kern="1200" dirty="0" err="1">
+                <a:solidFill>
+                  <a:schemeClr val="tx1"/>
+                </a:solidFill>
+                <a:effectLst/>
+                <a:latin typeface="+mn-lt"/>
+                <a:ea typeface="+mn-ea"/>
+                <a:cs typeface="+mn-cs"/>
+              </a:rPr>
+              <a:t>into</a:t>
+            </a:r>
+            <a:r>
+              <a:rPr lang="de-DE" sz="1200" b="0" i="0" u="none" strike="noStrike" kern="1200" dirty="0">
+                <a:solidFill>
+                  <a:schemeClr val="tx1"/>
+                </a:solidFill>
+                <a:effectLst/>
+                <a:latin typeface="+mn-lt"/>
+                <a:ea typeface="+mn-ea"/>
+                <a:cs typeface="+mn-cs"/>
+              </a:rPr>
+              <a:t> </a:t>
+            </a:r>
+            <a:r>
+              <a:rPr lang="de-DE" sz="1200" b="0" i="0" u="none" strike="noStrike" kern="1200" dirty="0" err="1">
+                <a:solidFill>
+                  <a:schemeClr val="tx1"/>
+                </a:solidFill>
+                <a:effectLst/>
+                <a:latin typeface="+mn-lt"/>
+                <a:ea typeface="+mn-ea"/>
+                <a:cs typeface="+mn-cs"/>
+              </a:rPr>
+              <a:t>the</a:t>
+            </a:r>
+            <a:r>
+              <a:rPr lang="de-DE" sz="1200" b="0" i="0" u="none" strike="noStrike" kern="1200" dirty="0">
+                <a:solidFill>
+                  <a:schemeClr val="tx1"/>
+                </a:solidFill>
+                <a:effectLst/>
+                <a:latin typeface="+mn-lt"/>
+                <a:ea typeface="+mn-ea"/>
+                <a:cs typeface="+mn-cs"/>
+              </a:rPr>
+              <a:t> </a:t>
+            </a:r>
+            <a:r>
+              <a:rPr lang="de-DE" sz="1200" b="0" i="0" u="none" strike="noStrike" kern="1200" dirty="0" err="1">
+                <a:solidFill>
+                  <a:schemeClr val="tx1"/>
+                </a:solidFill>
+                <a:effectLst/>
+                <a:latin typeface="+mn-lt"/>
+                <a:ea typeface="+mn-ea"/>
+                <a:cs typeface="+mn-cs"/>
+              </a:rPr>
+              <a:t>db</a:t>
+            </a:r>
+            <a:r>
+              <a:rPr lang="de-DE" sz="1200" b="0" i="0" u="none" strike="noStrike" kern="1200" dirty="0">
+                <a:solidFill>
+                  <a:schemeClr val="tx1"/>
+                </a:solidFill>
+                <a:effectLst/>
+                <a:latin typeface="+mn-lt"/>
+                <a:ea typeface="+mn-ea"/>
+                <a:cs typeface="+mn-cs"/>
+              </a:rPr>
+              <a:t>, </a:t>
+            </a:r>
+            <a:r>
+              <a:rPr lang="de-DE" sz="1200" b="0" i="0" u="none" strike="noStrike" kern="1200" dirty="0" err="1">
+                <a:solidFill>
+                  <a:schemeClr val="tx1"/>
+                </a:solidFill>
+                <a:effectLst/>
+                <a:latin typeface="+mn-lt"/>
+                <a:ea typeface="+mn-ea"/>
+                <a:cs typeface="+mn-cs"/>
+              </a:rPr>
+              <a:t>compress</a:t>
+            </a:r>
+            <a:r>
+              <a:rPr lang="de-DE" sz="1200" b="0" i="0" u="none" strike="noStrike" kern="1200" dirty="0">
+                <a:solidFill>
+                  <a:schemeClr val="tx1"/>
+                </a:solidFill>
+                <a:effectLst/>
+                <a:latin typeface="+mn-lt"/>
+                <a:ea typeface="+mn-ea"/>
+                <a:cs typeface="+mn-cs"/>
+              </a:rPr>
+              <a:t> </a:t>
+            </a:r>
+            <a:r>
+              <a:rPr lang="de-DE" sz="1200" b="0" i="0" u="none" strike="noStrike" kern="1200" dirty="0" err="1">
+                <a:solidFill>
+                  <a:schemeClr val="tx1"/>
+                </a:solidFill>
+                <a:effectLst/>
+                <a:latin typeface="+mn-lt"/>
+                <a:ea typeface="+mn-ea"/>
+                <a:cs typeface="+mn-cs"/>
+              </a:rPr>
+              <a:t>the</a:t>
+            </a:r>
+            <a:r>
+              <a:rPr lang="de-DE" sz="1200" b="0" i="0" u="none" strike="noStrike" kern="1200" dirty="0">
+                <a:solidFill>
+                  <a:schemeClr val="tx1"/>
+                </a:solidFill>
+                <a:effectLst/>
+                <a:latin typeface="+mn-lt"/>
+                <a:ea typeface="+mn-ea"/>
+                <a:cs typeface="+mn-cs"/>
+              </a:rPr>
+              <a:t> </a:t>
+            </a:r>
+            <a:r>
+              <a:rPr lang="de-DE" sz="1200" b="0" i="0" u="none" strike="noStrike" kern="1200" dirty="0" err="1">
+                <a:solidFill>
+                  <a:schemeClr val="tx1"/>
+                </a:solidFill>
+                <a:effectLst/>
+                <a:latin typeface="+mn-lt"/>
+                <a:ea typeface="+mn-ea"/>
+                <a:cs typeface="+mn-cs"/>
+              </a:rPr>
+              <a:t>csv</a:t>
+            </a:r>
+            <a:r>
+              <a:rPr lang="de-DE" sz="1200" b="0" i="0" u="none" strike="noStrike" kern="1200" dirty="0">
+                <a:solidFill>
+                  <a:schemeClr val="tx1"/>
+                </a:solidFill>
+                <a:effectLst/>
+                <a:latin typeface="+mn-lt"/>
+                <a:ea typeface="+mn-ea"/>
+                <a:cs typeface="+mn-cs"/>
+              </a:rPr>
+              <a:t> </a:t>
+            </a:r>
+            <a:r>
+              <a:rPr lang="de-DE" sz="1200" b="0" i="0" u="none" strike="noStrike" kern="1200" dirty="0" err="1">
+                <a:solidFill>
+                  <a:schemeClr val="tx1"/>
+                </a:solidFill>
+                <a:effectLst/>
+                <a:latin typeface="+mn-lt"/>
+                <a:ea typeface="+mn-ea"/>
+                <a:cs typeface="+mn-cs"/>
+              </a:rPr>
+              <a:t>file</a:t>
+            </a:r>
+            <a:r>
+              <a:rPr lang="de-DE" sz="1200" b="0" i="0" u="none" strike="noStrike" kern="1200" dirty="0">
+                <a:solidFill>
+                  <a:schemeClr val="tx1"/>
+                </a:solidFill>
+                <a:effectLst/>
+                <a:latin typeface="+mn-lt"/>
+                <a:ea typeface="+mn-ea"/>
+                <a:cs typeface="+mn-cs"/>
+              </a:rPr>
+              <a:t> </a:t>
+            </a:r>
+            <a:r>
+              <a:rPr lang="de-DE" sz="1200" b="0" i="0" u="none" strike="noStrike" kern="1200" dirty="0" err="1">
+                <a:solidFill>
+                  <a:schemeClr val="tx1"/>
+                </a:solidFill>
+                <a:effectLst/>
+                <a:latin typeface="+mn-lt"/>
+                <a:ea typeface="+mn-ea"/>
+                <a:cs typeface="+mn-cs"/>
+              </a:rPr>
+              <a:t>into</a:t>
+            </a:r>
+            <a:r>
+              <a:rPr lang="de-DE" sz="1200" b="0" i="0" u="none" strike="noStrike" kern="1200" dirty="0">
+                <a:solidFill>
+                  <a:schemeClr val="tx1"/>
+                </a:solidFill>
+                <a:effectLst/>
+                <a:latin typeface="+mn-lt"/>
+                <a:ea typeface="+mn-ea"/>
+                <a:cs typeface="+mn-cs"/>
+              </a:rPr>
+              <a:t> </a:t>
+            </a:r>
+            <a:r>
+              <a:rPr lang="de-DE" sz="1200" b="0" i="0" u="none" strike="noStrike" kern="1200" dirty="0" err="1">
+                <a:solidFill>
+                  <a:schemeClr val="tx1"/>
+                </a:solidFill>
+                <a:effectLst/>
+                <a:latin typeface="+mn-lt"/>
+                <a:ea typeface="+mn-ea"/>
+                <a:cs typeface="+mn-cs"/>
+              </a:rPr>
+              <a:t>zip</a:t>
+            </a:r>
+            <a:r>
+              <a:rPr lang="de-DE" sz="1200" b="0" i="0" u="none" strike="noStrike" kern="1200" dirty="0">
+                <a:solidFill>
+                  <a:schemeClr val="tx1"/>
+                </a:solidFill>
+                <a:effectLst/>
+                <a:latin typeface="+mn-lt"/>
+                <a:ea typeface="+mn-ea"/>
+                <a:cs typeface="+mn-cs"/>
+              </a:rPr>
+              <a:t> </a:t>
+            </a:r>
+            <a:r>
+              <a:rPr lang="de-DE" sz="1200" b="0" i="0" u="none" strike="noStrike" kern="1200" dirty="0" err="1">
+                <a:solidFill>
+                  <a:schemeClr val="tx1"/>
+                </a:solidFill>
+                <a:effectLst/>
+                <a:latin typeface="+mn-lt"/>
+                <a:ea typeface="+mn-ea"/>
+                <a:cs typeface="+mn-cs"/>
+              </a:rPr>
+              <a:t>that</a:t>
+            </a:r>
+            <a:r>
+              <a:rPr lang="de-DE" sz="1200" b="0" i="0" u="none" strike="noStrike" kern="1200" dirty="0">
+                <a:solidFill>
+                  <a:schemeClr val="tx1"/>
+                </a:solidFill>
+                <a:effectLst/>
+                <a:latin typeface="+mn-lt"/>
+                <a:ea typeface="+mn-ea"/>
+                <a:cs typeface="+mn-cs"/>
+              </a:rPr>
+              <a:t> </a:t>
+            </a:r>
+            <a:r>
+              <a:rPr lang="de-DE" sz="1200" b="0" i="0" u="none" strike="noStrike" kern="1200" dirty="0" err="1">
+                <a:solidFill>
+                  <a:schemeClr val="tx1"/>
+                </a:solidFill>
+                <a:effectLst/>
+                <a:latin typeface="+mn-lt"/>
+                <a:ea typeface="+mn-ea"/>
+                <a:cs typeface="+mn-cs"/>
+              </a:rPr>
+              <a:t>the</a:t>
+            </a:r>
+            <a:r>
+              <a:rPr lang="de-DE" sz="1200" b="0" i="0" u="none" strike="noStrike" kern="1200" dirty="0">
+                <a:solidFill>
+                  <a:schemeClr val="tx1"/>
+                </a:solidFill>
+                <a:effectLst/>
+                <a:latin typeface="+mn-lt"/>
+                <a:ea typeface="+mn-ea"/>
+                <a:cs typeface="+mn-cs"/>
+              </a:rPr>
+              <a:t> </a:t>
+            </a:r>
+            <a:r>
+              <a:rPr lang="de-DE" sz="1200" b="0" i="0" u="none" strike="noStrike" kern="1200" dirty="0" err="1">
+                <a:solidFill>
+                  <a:schemeClr val="tx1"/>
+                </a:solidFill>
+                <a:effectLst/>
+                <a:latin typeface="+mn-lt"/>
+                <a:ea typeface="+mn-ea"/>
+                <a:cs typeface="+mn-cs"/>
+              </a:rPr>
+              <a:t>client</a:t>
+            </a:r>
+            <a:r>
+              <a:rPr lang="de-DE" sz="1200" b="0" i="0" u="none" strike="noStrike" kern="1200" dirty="0">
+                <a:solidFill>
+                  <a:schemeClr val="tx1"/>
+                </a:solidFill>
+                <a:effectLst/>
+                <a:latin typeface="+mn-lt"/>
+                <a:ea typeface="+mn-ea"/>
+                <a:cs typeface="+mn-cs"/>
+              </a:rPr>
+              <a:t> was </a:t>
+            </a:r>
+            <a:r>
+              <a:rPr lang="de-DE" sz="1200" b="0" i="0" u="none" strike="noStrike" kern="1200" dirty="0" err="1">
+                <a:solidFill>
+                  <a:schemeClr val="tx1"/>
+                </a:solidFill>
+                <a:effectLst/>
+                <a:latin typeface="+mn-lt"/>
+                <a:ea typeface="+mn-ea"/>
+                <a:cs typeface="+mn-cs"/>
+              </a:rPr>
+              <a:t>able</a:t>
+            </a:r>
+            <a:r>
+              <a:rPr lang="de-DE" sz="1200" b="0" i="0" u="none" strike="noStrike" kern="1200" dirty="0">
+                <a:solidFill>
+                  <a:schemeClr val="tx1"/>
+                </a:solidFill>
+                <a:effectLst/>
+                <a:latin typeface="+mn-lt"/>
+                <a:ea typeface="+mn-ea"/>
+                <a:cs typeface="+mn-cs"/>
+              </a:rPr>
+              <a:t> </a:t>
+            </a:r>
+            <a:r>
+              <a:rPr lang="de-DE" sz="1200" b="0" i="0" u="none" strike="noStrike" kern="1200" dirty="0" err="1">
+                <a:solidFill>
+                  <a:schemeClr val="tx1"/>
+                </a:solidFill>
+                <a:effectLst/>
+                <a:latin typeface="+mn-lt"/>
+                <a:ea typeface="+mn-ea"/>
+                <a:cs typeface="+mn-cs"/>
+              </a:rPr>
+              <a:t>to</a:t>
+            </a:r>
+            <a:r>
+              <a:rPr lang="de-DE" sz="1200" b="0" i="0" u="none" strike="noStrike" kern="1200" dirty="0">
+                <a:solidFill>
+                  <a:schemeClr val="tx1"/>
+                </a:solidFill>
+                <a:effectLst/>
+                <a:latin typeface="+mn-lt"/>
+                <a:ea typeface="+mn-ea"/>
+                <a:cs typeface="+mn-cs"/>
+              </a:rPr>
+              <a:t> </a:t>
+            </a:r>
+            <a:r>
+              <a:rPr lang="de-DE" sz="1200" b="0" i="0" u="none" strike="noStrike" kern="1200" dirty="0" err="1">
+                <a:solidFill>
+                  <a:schemeClr val="tx1"/>
+                </a:solidFill>
+                <a:effectLst/>
+                <a:latin typeface="+mn-lt"/>
+                <a:ea typeface="+mn-ea"/>
+                <a:cs typeface="+mn-cs"/>
+              </a:rPr>
+              <a:t>read</a:t>
+            </a:r>
+            <a:r>
+              <a:rPr lang="de-DE" sz="1200" b="0" i="0" u="none" strike="noStrike" kern="1200" dirty="0">
+                <a:solidFill>
+                  <a:schemeClr val="tx1"/>
+                </a:solidFill>
+                <a:effectLst/>
+                <a:latin typeface="+mn-lt"/>
+                <a:ea typeface="+mn-ea"/>
+                <a:cs typeface="+mn-cs"/>
+              </a:rPr>
+              <a:t> </a:t>
+            </a:r>
+            <a:r>
+              <a:rPr lang="de-DE" sz="1200" b="0" i="0" u="none" strike="noStrike" kern="1200" dirty="0" err="1">
+                <a:solidFill>
+                  <a:schemeClr val="tx1"/>
+                </a:solidFill>
+                <a:effectLst/>
+                <a:latin typeface="+mn-lt"/>
+                <a:ea typeface="+mn-ea"/>
+                <a:cs typeface="+mn-cs"/>
+              </a:rPr>
+              <a:t>it</a:t>
+            </a:r>
+            <a:r>
+              <a:rPr lang="de-DE" sz="1200" b="0" i="0" u="none" strike="noStrike" kern="1200" dirty="0">
+                <a:solidFill>
+                  <a:schemeClr val="tx1"/>
+                </a:solidFill>
+                <a:effectLst/>
+                <a:latin typeface="+mn-lt"/>
+                <a:ea typeface="+mn-ea"/>
+                <a:cs typeface="+mn-cs"/>
+              </a:rPr>
+              <a:t> </a:t>
+            </a:r>
+            <a:r>
+              <a:rPr lang="de-DE" sz="1200" b="0" i="0" u="none" strike="noStrike" kern="1200" dirty="0" err="1">
+                <a:solidFill>
+                  <a:schemeClr val="tx1"/>
+                </a:solidFill>
+                <a:effectLst/>
+                <a:latin typeface="+mn-lt"/>
+                <a:ea typeface="+mn-ea"/>
+                <a:cs typeface="+mn-cs"/>
+              </a:rPr>
+              <a:t>and</a:t>
+            </a:r>
+            <a:r>
+              <a:rPr lang="de-DE" sz="1200" b="0" i="0" u="none" strike="noStrike" kern="1200" dirty="0">
+                <a:solidFill>
+                  <a:schemeClr val="tx1"/>
+                </a:solidFill>
+                <a:effectLst/>
+                <a:latin typeface="+mn-lt"/>
+                <a:ea typeface="+mn-ea"/>
+                <a:cs typeface="+mn-cs"/>
+              </a:rPr>
+              <a:t> also </a:t>
+            </a:r>
+            <a:r>
+              <a:rPr lang="de-DE" sz="1200" b="0" i="0" u="none" strike="noStrike" kern="1200" dirty="0" err="1">
+                <a:solidFill>
+                  <a:schemeClr val="tx1"/>
+                </a:solidFill>
+                <a:effectLst/>
+                <a:latin typeface="+mn-lt"/>
+                <a:ea typeface="+mn-ea"/>
+                <a:cs typeface="+mn-cs"/>
+              </a:rPr>
+              <a:t>to</a:t>
+            </a:r>
+            <a:r>
+              <a:rPr lang="de-DE" sz="1200" b="0" i="0" u="none" strike="noStrike" kern="1200" dirty="0">
+                <a:solidFill>
+                  <a:schemeClr val="tx1"/>
+                </a:solidFill>
+                <a:effectLst/>
+                <a:latin typeface="+mn-lt"/>
+                <a:ea typeface="+mn-ea"/>
+                <a:cs typeface="+mn-cs"/>
+              </a:rPr>
+              <a:t> </a:t>
+            </a:r>
+            <a:r>
+              <a:rPr lang="de-DE" sz="1200" b="0" i="0" u="none" strike="noStrike" kern="1200" dirty="0" err="1">
+                <a:solidFill>
+                  <a:schemeClr val="tx1"/>
+                </a:solidFill>
+                <a:effectLst/>
+                <a:latin typeface="+mn-lt"/>
+                <a:ea typeface="+mn-ea"/>
+                <a:cs typeface="+mn-cs"/>
+              </a:rPr>
+              <a:t>separted</a:t>
+            </a:r>
+            <a:r>
+              <a:rPr lang="de-DE" sz="1200" b="0" i="0" u="none" strike="noStrike" kern="1200" dirty="0">
+                <a:solidFill>
+                  <a:schemeClr val="tx1"/>
+                </a:solidFill>
+                <a:effectLst/>
+                <a:latin typeface="+mn-lt"/>
+                <a:ea typeface="+mn-ea"/>
+                <a:cs typeface="+mn-cs"/>
+              </a:rPr>
+              <a:t> it.....</a:t>
+            </a:r>
+          </a:p>
+          <a:p>
+            <a:endParaRPr lang="de-DE" sz="1200" b="0" i="0" u="none" strike="noStrike" kern="1200" dirty="0">
+              <a:solidFill>
+                <a:schemeClr val="tx1"/>
+              </a:solidFill>
+              <a:effectLst/>
+              <a:latin typeface="+mn-lt"/>
+              <a:ea typeface="+mn-ea"/>
+              <a:cs typeface="+mn-cs"/>
+            </a:endParaRPr>
           </a:p>
         </p:txBody>
       </p:sp>
@@ -2561,6 +2562,90 @@
             <a:fld id="{3BC40F18-5B78-A24D-B5E4-E4AF3DDF4FDC}" type="slidenum">
               <a:rPr lang="de-DE" smtClean="0"/>
               <a:t>9</a:t>
+            </a:fld>
+            <a:endParaRPr lang="de-DE"/>
+          </a:p>
+        </p:txBody>
+      </p:sp>
+    </p:spTree>
+    <p:extLst>
+      <p:ext uri="{BB962C8B-B14F-4D97-AF65-F5344CB8AC3E}">
+        <p14:creationId xmlns:p14="http://schemas.microsoft.com/office/powerpoint/2010/main" val="69945829"/>
+      </p:ext>
+    </p:extLst>
+  </p:cSld>
+  <p:clrMapOvr>
+    <a:masterClrMapping/>
+  </p:clrMapOvr>
+</p:notes>
+</file>
+
+<file path=ppt/notesSlides/notesSlide4.xml><?xml version="1.0" encoding="utf-8"?>
+<p:notes xmlns:a="http://schemas.openxmlformats.org/drawingml/2006/main" xmlns:r="http://schemas.openxmlformats.org/officeDocument/2006/relationships" xmlns:p="http://schemas.openxmlformats.org/presentationml/2006/main">
+  <p:cSld>
+    <p:spTree>
+      <p:nvGrpSpPr>
+        <p:cNvPr id="1" name=""/>
+        <p:cNvGrpSpPr/>
+        <p:nvPr/>
+      </p:nvGrpSpPr>
+      <p:grpSpPr>
+        <a:xfrm>
+          <a:off x="0" y="0"/>
+          <a:ext cx="0" cy="0"/>
+          <a:chOff x="0" y="0"/>
+          <a:chExt cx="0" cy="0"/>
+        </a:xfrm>
+      </p:grpSpPr>
+      <p:sp>
+        <p:nvSpPr>
+          <p:cNvPr id="2" name="Folienbildplatzhalter 1"/>
+          <p:cNvSpPr>
+            <a:spLocks noGrp="1" noRot="1" noChangeAspect="1"/>
+          </p:cNvSpPr>
+          <p:nvPr>
+            <p:ph type="sldImg"/>
+          </p:nvPr>
+        </p:nvSpPr>
+        <p:spPr/>
+      </p:sp>
+      <p:sp>
+        <p:nvSpPr>
+          <p:cNvPr id="3" name="Notizenplatzhalter 2"/>
+          <p:cNvSpPr>
+            <a:spLocks noGrp="1"/>
+          </p:cNvSpPr>
+          <p:nvPr>
+            <p:ph type="body" idx="1"/>
+          </p:nvPr>
+        </p:nvSpPr>
+        <p:spPr/>
+        <p:txBody>
+          <a:bodyPr/>
+          <a:lstStyle/>
+          <a:p>
+            <a:endParaRPr lang="de-DE" dirty="0"/>
+          </a:p>
+        </p:txBody>
+      </p:sp>
+      <p:sp>
+        <p:nvSpPr>
+          <p:cNvPr id="4" name="Foliennummernplatzhalter 3"/>
+          <p:cNvSpPr>
+            <a:spLocks noGrp="1"/>
+          </p:cNvSpPr>
+          <p:nvPr>
+            <p:ph type="sldNum" sz="quarter" idx="5"/>
+          </p:nvPr>
+        </p:nvSpPr>
+        <p:spPr/>
+        <p:txBody>
+          <a:bodyPr/>
+          <a:lstStyle/>
+          <a:p>
+            <a:fld id="{3BC40F18-5B78-A24D-B5E4-E4AF3DDF4FDC}" type="slidenum">
+              <a:rPr lang="de-DE" smtClean="0"/>
+              <a:t>10</a:t>
             </a:fld>
             <a:endParaRPr lang="de-DE"/>
           </a:p>
@@ -7295,6 +7380,172 @@
           <p:nvPr/>
         </p:nvPicPr>
         <p:blipFill>
+          <a:blip r:embed="rId3"/>
+          <a:stretch>
+            <a:fillRect/>
+          </a:stretch>
+        </p:blipFill>
+        <p:spPr>
+          <a:xfrm>
+            <a:off x="9715096" y="-1"/>
+            <a:ext cx="2476904" cy="667265"/>
+          </a:xfrm>
+          <a:prstGeom prst="rect">
+            <a:avLst/>
+          </a:prstGeom>
+        </p:spPr>
+      </p:pic>
+      <p:sp>
+        <p:nvSpPr>
+          <p:cNvPr id="2" name="Titel 1">
+            <a:extLst>
+              <a:ext uri="{FF2B5EF4-FFF2-40B4-BE49-F238E27FC236}">
+                <a16:creationId xmlns:a16="http://schemas.microsoft.com/office/drawing/2014/main" id="{85AE4CB9-396C-4221-B8BE-934059DDC97F}"/>
+              </a:ext>
+            </a:extLst>
+          </p:cNvPr>
+          <p:cNvSpPr>
+            <a:spLocks noGrp="1"/>
+          </p:cNvSpPr>
+          <p:nvPr>
+            <p:ph type="ctrTitle"/>
+          </p:nvPr>
+        </p:nvSpPr>
+        <p:spPr>
+          <a:xfrm>
+            <a:off x="546383" y="1508167"/>
+            <a:ext cx="2476904" cy="429012"/>
+          </a:xfrm>
+        </p:spPr>
+        <p:txBody>
+          <a:bodyPr>
+            <a:noAutofit/>
+          </a:bodyPr>
+          <a:lstStyle/>
+          <a:p>
+            <a:r>
+              <a:rPr lang="de-DE" sz="2800" b="1" dirty="0">
+                <a:latin typeface="Times" pitchFamily="2" charset="0"/>
+                <a:cs typeface="Arial" panose="020B0604020202020204" pitchFamily="34" charset="0"/>
+              </a:rPr>
+              <a:t>Star Schema</a:t>
+            </a:r>
+          </a:p>
+        </p:txBody>
+      </p:sp>
+      <p:pic>
+        <p:nvPicPr>
+          <p:cNvPr id="3" name="Grafik 2">
+            <a:extLst>
+              <a:ext uri="{FF2B5EF4-FFF2-40B4-BE49-F238E27FC236}">
+                <a16:creationId xmlns:a16="http://schemas.microsoft.com/office/drawing/2014/main" id="{29535A4A-85E9-4B1B-B6BD-24A5216F9739}"/>
+              </a:ext>
+            </a:extLst>
+          </p:cNvPr>
+          <p:cNvPicPr>
+            <a:picLocks noChangeAspect="1"/>
+          </p:cNvPicPr>
+          <p:nvPr/>
+        </p:nvPicPr>
+        <p:blipFill>
+          <a:blip r:embed="rId4"/>
+          <a:stretch>
+            <a:fillRect/>
+          </a:stretch>
+        </p:blipFill>
+        <p:spPr>
+          <a:xfrm>
+            <a:off x="3270422" y="667263"/>
+            <a:ext cx="6944497" cy="5599495"/>
+          </a:xfrm>
+          <a:prstGeom prst="rect">
+            <a:avLst/>
+          </a:prstGeom>
+        </p:spPr>
+      </p:pic>
+      <p:sp>
+        <p:nvSpPr>
+          <p:cNvPr id="5" name="Textfeld 4">
+            <a:extLst>
+              <a:ext uri="{FF2B5EF4-FFF2-40B4-BE49-F238E27FC236}">
+                <a16:creationId xmlns:a16="http://schemas.microsoft.com/office/drawing/2014/main" id="{AD024712-EA85-4558-8B3B-B99CAF87ECC2}"/>
+              </a:ext>
+            </a:extLst>
+          </p:cNvPr>
+          <p:cNvSpPr txBox="1"/>
+          <p:nvPr/>
+        </p:nvSpPr>
+        <p:spPr>
+          <a:xfrm>
+            <a:off x="5577016" y="6367849"/>
+            <a:ext cx="2331308" cy="307777"/>
+          </a:xfrm>
+          <a:prstGeom prst="rect">
+            <a:avLst/>
+          </a:prstGeom>
+          <a:noFill/>
+        </p:spPr>
+        <p:txBody>
+          <a:bodyPr wrap="square" rtlCol="0">
+            <a:spAutoFit/>
+          </a:bodyPr>
+          <a:lstStyle/>
+          <a:p>
+            <a:r>
+              <a:rPr lang="de-DE" sz="1400" dirty="0">
+                <a:latin typeface="Times" pitchFamily="2" charset="0"/>
+                <a:cs typeface="Arial" panose="020B0604020202020204" pitchFamily="34" charset="0"/>
+              </a:rPr>
+              <a:t>Figure 2: Star Schema</a:t>
+            </a:r>
+          </a:p>
+        </p:txBody>
+      </p:sp>
+    </p:spTree>
+    <p:extLst>
+      <p:ext uri="{BB962C8B-B14F-4D97-AF65-F5344CB8AC3E}">
+        <p14:creationId xmlns:p14="http://schemas.microsoft.com/office/powerpoint/2010/main" val="102582351"/>
+      </p:ext>
+    </p:extLst>
+  </p:cSld>
+  <p:clrMapOvr>
+    <a:masterClrMapping/>
+  </p:clrMapOvr>
+</p:sld>
+</file>
+
+<file path=ppt/slides/slide11.xml><?xml version="1.0" encoding="utf-8"?>
+<p:sld xmlns:a="http://schemas.openxmlformats.org/drawingml/2006/main" xmlns:r="http://schemas.openxmlformats.org/officeDocument/2006/relationships" xmlns:p="http://schemas.openxmlformats.org/presentationml/2006/main">
+  <p:cSld>
+    <p:spTree>
+      <p:nvGrpSpPr>
+        <p:cNvPr id="1" name=""/>
+        <p:cNvGrpSpPr/>
+        <p:nvPr/>
+      </p:nvGrpSpPr>
+      <p:grpSpPr>
+        <a:xfrm>
+          <a:off x="0" y="0"/>
+          <a:ext cx="0" cy="0"/>
+          <a:chOff x="0" y="0"/>
+          <a:chExt cx="0" cy="0"/>
+        </a:xfrm>
+      </p:grpSpPr>
+      <p:pic>
+        <p:nvPicPr>
+          <p:cNvPr id="4" name="Grafik 3">
+            <a:extLst>
+              <a:ext uri="{FF2B5EF4-FFF2-40B4-BE49-F238E27FC236}">
+                <a16:creationId xmlns:a16="http://schemas.microsoft.com/office/drawing/2014/main" id="{B7221E9E-1B0E-4690-AB66-2428FA7A3509}"/>
+              </a:ext>
+            </a:extLst>
+          </p:cNvPr>
+          <p:cNvPicPr>
+            <a:picLocks noChangeAspect="1"/>
+          </p:cNvPicPr>
+          <p:nvPr/>
+        </p:nvPicPr>
+        <p:blipFill>
           <a:blip r:embed="rId2"/>
           <a:stretch>
             <a:fillRect/>
@@ -7428,7 +7679,7 @@
 </p:sld>
 </file>
 
-<file path=ppt/slides/slide11.xml><?xml version="1.0" encoding="utf-8"?>
+<file path=ppt/slides/slide12.xml><?xml version="1.0" encoding="utf-8"?>
 <p:sld xmlns:a="http://schemas.openxmlformats.org/drawingml/2006/main" xmlns:r="http://schemas.openxmlformats.org/officeDocument/2006/relationships" xmlns:p="http://schemas.openxmlformats.org/presentationml/2006/main">
   <p:cSld>
     <p:spTree>
@@ -10000,12 +10251,75 @@
           <a:chExt cx="0" cy="0"/>
         </a:xfrm>
       </p:grpSpPr>
+      <p:sp>
+        <p:nvSpPr>
+          <p:cNvPr id="2" name="Titel 1">
+            <a:extLst>
+              <a:ext uri="{FF2B5EF4-FFF2-40B4-BE49-F238E27FC236}">
+                <a16:creationId xmlns:a16="http://schemas.microsoft.com/office/drawing/2014/main" id="{FCAD53FF-F670-F146-9BD5-ACB5399ACE5D}"/>
+              </a:ext>
+            </a:extLst>
+          </p:cNvPr>
+          <p:cNvSpPr>
+            <a:spLocks noGrp="1"/>
+          </p:cNvSpPr>
+          <p:nvPr>
+            <p:ph type="title"/>
+          </p:nvPr>
+        </p:nvSpPr>
+        <p:spPr/>
+        <p:txBody>
+          <a:bodyPr/>
+          <a:lstStyle/>
+          <a:p>
+            <a:r>
+              <a:rPr lang="de-DE" dirty="0" err="1"/>
+              <a:t>GitHub</a:t>
+            </a:r>
+            <a:endParaRPr lang="de-DE" dirty="0"/>
+          </a:p>
+        </p:txBody>
+      </p:sp>
       <p:pic>
         <p:nvPicPr>
-          <p:cNvPr id="4" name="Grafik 3">
+          <p:cNvPr id="5" name="Inhaltsplatzhalter 4">
             <a:extLst>
               <a:ext uri="{FF2B5EF4-FFF2-40B4-BE49-F238E27FC236}">
-                <a16:creationId xmlns:a16="http://schemas.microsoft.com/office/drawing/2014/main" id="{B7221E9E-1B0E-4690-AB66-2428FA7A3509}"/>
+                <a16:creationId xmlns:a16="http://schemas.microsoft.com/office/drawing/2014/main" id="{DE24E298-7988-0E4D-8CCC-313798DF440F}"/>
+              </a:ext>
+            </a:extLst>
+          </p:cNvPr>
+          <p:cNvPicPr>
+            <a:picLocks noGrp="1" noChangeAspect="1"/>
+          </p:cNvPicPr>
+          <p:nvPr>
+            <p:ph idx="1"/>
+          </p:nvPr>
+        </p:nvPicPr>
+        <p:blipFill rotWithShape="1">
+          <a:blip r:embed="rId3">
+            <a:extLst>
+              <a:ext uri="{28A0092B-C50C-407E-A947-70E740481C1C}">
+                <a14:useLocalDpi xmlns:a14="http://schemas.microsoft.com/office/drawing/2010/main" val="0"/>
+              </a:ext>
+            </a:extLst>
+          </a:blip>
+          <a:srcRect l="9763" t="11606" r="12090" b="11012"/>
+          <a:stretch/>
+        </p:blipFill>
+        <p:spPr>
+          <a:xfrm>
+            <a:off x="5947724" y="2850015"/>
+            <a:ext cx="4838810" cy="2709334"/>
+          </a:xfrm>
+        </p:spPr>
+      </p:pic>
+      <p:pic>
+        <p:nvPicPr>
+          <p:cNvPr id="7" name="Grafik 6">
+            <a:extLst>
+              <a:ext uri="{FF2B5EF4-FFF2-40B4-BE49-F238E27FC236}">
+                <a16:creationId xmlns:a16="http://schemas.microsoft.com/office/drawing/2014/main" id="{1952623C-68F9-AF41-8FC9-9C2266728AC8}"/>
               </a:ext>
             </a:extLst>
           </p:cNvPr>
@@ -10015,15 +10329,21 @@
           <p:nvPr/>
         </p:nvPicPr>
         <p:blipFill>
-          <a:blip r:embed="rId3"/>
+          <a:blip r:embed="rId4">
+            <a:extLst>
+              <a:ext uri="{28A0092B-C50C-407E-A947-70E740481C1C}">
+                <a14:useLocalDpi xmlns:a14="http://schemas.microsoft.com/office/drawing/2010/main" val="0"/>
+              </a:ext>
+            </a:extLst>
+          </a:blip>
           <a:stretch>
             <a:fillRect/>
           </a:stretch>
         </p:blipFill>
         <p:spPr>
           <a:xfrm>
-            <a:off x="9715096" y="-1"/>
-            <a:ext cx="2476904" cy="667265"/>
+            <a:off x="1651865" y="2890385"/>
+            <a:ext cx="3055602" cy="1077229"/>
           </a:xfrm>
           <a:prstGeom prst="rect">
             <a:avLst/>
@@ -10032,62 +10352,10 @@
       </p:pic>
       <p:sp>
         <p:nvSpPr>
-          <p:cNvPr id="2" name="Titel 1">
+          <p:cNvPr id="8" name="Textfeld 7">
             <a:extLst>
               <a:ext uri="{FF2B5EF4-FFF2-40B4-BE49-F238E27FC236}">
-                <a16:creationId xmlns:a16="http://schemas.microsoft.com/office/drawing/2014/main" id="{85AE4CB9-396C-4221-B8BE-934059DDC97F}"/>
-              </a:ext>
-            </a:extLst>
-          </p:cNvPr>
-          <p:cNvSpPr>
-            <a:spLocks noGrp="1"/>
-          </p:cNvSpPr>
-          <p:nvPr>
-            <p:ph type="ctrTitle"/>
-          </p:nvPr>
-        </p:nvSpPr>
-        <p:spPr>
-          <a:xfrm>
-            <a:off x="-659027" y="1046849"/>
-            <a:ext cx="5936795" cy="429012"/>
-          </a:xfrm>
-        </p:spPr>
-        <p:txBody>
-          <a:bodyPr>
-            <a:noAutofit/>
-          </a:bodyPr>
-          <a:lstStyle/>
-          <a:p>
-            <a:r>
-              <a:rPr lang="de-DE" sz="2400" b="1" dirty="0">
-                <a:latin typeface="Times" pitchFamily="2" charset="0"/>
-                <a:cs typeface="Arial" panose="020B0604020202020204" pitchFamily="34" charset="0"/>
-              </a:rPr>
-              <a:t>Data </a:t>
-            </a:r>
-            <a:r>
-              <a:rPr lang="de-DE" sz="2400" b="1" dirty="0" err="1">
-                <a:latin typeface="Times" pitchFamily="2" charset="0"/>
-                <a:cs typeface="Arial" panose="020B0604020202020204" pitchFamily="34" charset="0"/>
-              </a:rPr>
-              <a:t>Preparation</a:t>
-            </a:r>
-            <a:r>
-              <a:rPr lang="de-DE" sz="2400" b="1" dirty="0">
-                <a:latin typeface="Times" pitchFamily="2" charset="0"/>
-                <a:cs typeface="Arial" panose="020B0604020202020204" pitchFamily="34" charset="0"/>
-              </a:rPr>
-              <a:t> Phase</a:t>
-            </a:r>
-          </a:p>
-        </p:txBody>
-      </p:sp>
-      <p:sp>
-        <p:nvSpPr>
-          <p:cNvPr id="6" name="Textfeld 5">
-            <a:extLst>
-              <a:ext uri="{FF2B5EF4-FFF2-40B4-BE49-F238E27FC236}">
-                <a16:creationId xmlns:a16="http://schemas.microsoft.com/office/drawing/2014/main" id="{DACAD11C-BB60-4978-9D9F-53388F62B2E2}"/>
+                <a16:creationId xmlns:a16="http://schemas.microsoft.com/office/drawing/2014/main" id="{C5057A8D-C290-C441-B71E-5DC9E2C68261}"/>
               </a:ext>
             </a:extLst>
           </p:cNvPr>
@@ -10096,8 +10364,8 @@
         </p:nvSpPr>
         <p:spPr>
           <a:xfrm>
-            <a:off x="172995" y="1919416"/>
-            <a:ext cx="9489989" cy="369332"/>
+            <a:off x="1651865" y="1793467"/>
+            <a:ext cx="9489989" cy="646331"/>
           </a:xfrm>
           <a:prstGeom prst="rect">
             <a:avLst/>
@@ -10110,75 +10378,118 @@
           </a:bodyPr>
           <a:lstStyle/>
           <a:p>
+            <a:pPr marL="285750" indent="-285750">
+              <a:buFont typeface="Arial" panose="020B0604020202020204" pitchFamily="34" charset="0"/>
+              <a:buChar char="•"/>
+            </a:pPr>
             <a:r>
               <a:rPr lang="de-DE" dirty="0">
                 <a:latin typeface="Times" pitchFamily="2" charset="0"/>
                 <a:cs typeface="Arial" panose="020B0604020202020204" pitchFamily="34" charset="0"/>
               </a:rPr>
-              <a:t>Data </a:t>
+              <a:t>Source </a:t>
             </a:r>
             <a:r>
               <a:rPr lang="de-DE" dirty="0" err="1">
                 <a:latin typeface="Times" pitchFamily="2" charset="0"/>
                 <a:cs typeface="Arial" panose="020B0604020202020204" pitchFamily="34" charset="0"/>
               </a:rPr>
-              <a:t>Preparation</a:t>
+              <a:t>code</a:t>
             </a:r>
             <a:r>
               <a:rPr lang="de-DE" dirty="0">
                 <a:latin typeface="Times" pitchFamily="2" charset="0"/>
                 <a:cs typeface="Arial" panose="020B0604020202020204" pitchFamily="34" charset="0"/>
               </a:rPr>
-              <a:t> and - </a:t>
+              <a:t> </a:t>
             </a:r>
             <a:r>
               <a:rPr lang="de-DE" dirty="0" err="1">
                 <a:latin typeface="Times" pitchFamily="2" charset="0"/>
                 <a:cs typeface="Arial" panose="020B0604020202020204" pitchFamily="34" charset="0"/>
               </a:rPr>
-              <a:t>Cleansing</a:t>
+              <a:t>management</a:t>
             </a:r>
             <a:endParaRPr lang="de-DE" dirty="0">
               <a:latin typeface="Times" pitchFamily="2" charset="0"/>
               <a:cs typeface="Arial" panose="020B0604020202020204" pitchFamily="34" charset="0"/>
             </a:endParaRPr>
           </a:p>
+          <a:p>
+            <a:pPr marL="285750" indent="-285750">
+              <a:buFont typeface="Arial" panose="020B0604020202020204" pitchFamily="34" charset="0"/>
+              <a:buChar char="•"/>
+            </a:pPr>
+            <a:r>
+              <a:rPr lang="de-DE" dirty="0">
+                <a:latin typeface="Times" pitchFamily="2" charset="0"/>
+                <a:cs typeface="Arial" panose="020B0604020202020204" pitchFamily="34" charset="0"/>
+              </a:rPr>
+              <a:t>Working </a:t>
+            </a:r>
+            <a:r>
+              <a:rPr lang="de-DE" dirty="0" err="1">
+                <a:latin typeface="Times" pitchFamily="2" charset="0"/>
+                <a:cs typeface="Arial" panose="020B0604020202020204" pitchFamily="34" charset="0"/>
+              </a:rPr>
+              <a:t>efficent</a:t>
+            </a:r>
+            <a:r>
+              <a:rPr lang="de-DE" dirty="0">
+                <a:latin typeface="Times" pitchFamily="2" charset="0"/>
+                <a:cs typeface="Arial" panose="020B0604020202020204" pitchFamily="34" charset="0"/>
+              </a:rPr>
+              <a:t> in </a:t>
+            </a:r>
+            <a:r>
+              <a:rPr lang="de-DE" dirty="0" err="1">
+                <a:latin typeface="Times" pitchFamily="2" charset="0"/>
+                <a:cs typeface="Arial" panose="020B0604020202020204" pitchFamily="34" charset="0"/>
+              </a:rPr>
+              <a:t>our</a:t>
+            </a:r>
+            <a:r>
+              <a:rPr lang="de-DE" dirty="0">
+                <a:latin typeface="Times" pitchFamily="2" charset="0"/>
+                <a:cs typeface="Arial" panose="020B0604020202020204" pitchFamily="34" charset="0"/>
+              </a:rPr>
+              <a:t> </a:t>
+            </a:r>
+            <a:r>
+              <a:rPr lang="de-DE" dirty="0" err="1">
+                <a:latin typeface="Times" pitchFamily="2" charset="0"/>
+                <a:cs typeface="Arial" panose="020B0604020202020204" pitchFamily="34" charset="0"/>
+              </a:rPr>
+              <a:t>team</a:t>
+            </a:r>
+            <a:r>
+              <a:rPr lang="de-DE" dirty="0">
+                <a:latin typeface="Times" pitchFamily="2" charset="0"/>
+                <a:cs typeface="Arial" panose="020B0604020202020204" pitchFamily="34" charset="0"/>
+              </a:rPr>
+              <a:t> (e.g. PowerPoint </a:t>
+            </a:r>
+            <a:r>
+              <a:rPr lang="de-DE" dirty="0" err="1">
+                <a:latin typeface="Times" pitchFamily="2" charset="0"/>
+                <a:cs typeface="Arial" panose="020B0604020202020204" pitchFamily="34" charset="0"/>
+              </a:rPr>
+              <a:t>presentation</a:t>
+            </a:r>
+            <a:r>
+              <a:rPr lang="de-DE" dirty="0">
+                <a:latin typeface="Times" pitchFamily="2" charset="0"/>
+                <a:cs typeface="Arial" panose="020B0604020202020204" pitchFamily="34" charset="0"/>
+              </a:rPr>
+              <a:t>)</a:t>
+            </a:r>
+          </a:p>
         </p:txBody>
       </p:sp>
-      <p:pic>
-        <p:nvPicPr>
-          <p:cNvPr id="7" name="Grafik 6">
-            <a:extLst>
-              <a:ext uri="{FF2B5EF4-FFF2-40B4-BE49-F238E27FC236}">
-                <a16:creationId xmlns:a16="http://schemas.microsoft.com/office/drawing/2014/main" id="{CC039438-7CCF-4504-8EF3-C60441311620}"/>
-              </a:ext>
-            </a:extLst>
-          </p:cNvPr>
-          <p:cNvPicPr>
-            <a:picLocks noChangeAspect="1"/>
-          </p:cNvPicPr>
-          <p:nvPr/>
-        </p:nvPicPr>
-        <p:blipFill>
-          <a:blip r:embed="rId4"/>
-          <a:stretch>
-            <a:fillRect/>
-          </a:stretch>
-        </p:blipFill>
-        <p:spPr>
-          <a:xfrm>
-            <a:off x="4006656" y="1693763"/>
-            <a:ext cx="8012349" cy="5007718"/>
-          </a:xfrm>
-          <a:prstGeom prst="rect">
-            <a:avLst/>
-          </a:prstGeom>
-        </p:spPr>
-      </p:pic>
     </p:spTree>
     <p:extLst>
       <p:ext uri="{BB962C8B-B14F-4D97-AF65-F5344CB8AC3E}">
-        <p14:creationId xmlns:p14="http://schemas.microsoft.com/office/powerpoint/2010/main" val="3085713717"/>
+        <p14:creationId xmlns:p14="http://schemas.microsoft.com/office/powerpoint/2010/main" val="2922025352"/>
       </p:ext>
     </p:extLst>
   </p:cSld>
@@ -10253,8 +10564,8 @@
         </p:nvSpPr>
         <p:spPr>
           <a:xfrm>
-            <a:off x="546383" y="1508167"/>
-            <a:ext cx="2476904" cy="429012"/>
+            <a:off x="-659027" y="1046849"/>
+            <a:ext cx="5936795" cy="429012"/>
           </a:xfrm>
         </p:spPr>
         <p:txBody>
@@ -10264,21 +10575,108 @@
           <a:lstStyle/>
           <a:p>
             <a:r>
-              <a:rPr lang="de-DE" sz="2800" b="1" dirty="0">
-                <a:latin typeface="Times" pitchFamily="2" charset="0"/>
-                <a:cs typeface="Arial" panose="020B0604020202020204" pitchFamily="34" charset="0"/>
-              </a:rPr>
-              <a:t>Star Schema</a:t>
-            </a:r>
+              <a:rPr lang="de-DE" sz="2400" b="1" dirty="0">
+                <a:latin typeface="Times" pitchFamily="2" charset="0"/>
+                <a:cs typeface="Arial" panose="020B0604020202020204" pitchFamily="34" charset="0"/>
+              </a:rPr>
+              <a:t>Data </a:t>
+            </a:r>
+            <a:r>
+              <a:rPr lang="de-DE" sz="2400" b="1" dirty="0" err="1">
+                <a:latin typeface="Times" pitchFamily="2" charset="0"/>
+                <a:cs typeface="Arial" panose="020B0604020202020204" pitchFamily="34" charset="0"/>
+              </a:rPr>
+              <a:t>Preparation</a:t>
+            </a:r>
+            <a:r>
+              <a:rPr lang="de-DE" sz="2400" b="1" dirty="0">
+                <a:latin typeface="Times" pitchFamily="2" charset="0"/>
+                <a:cs typeface="Arial" panose="020B0604020202020204" pitchFamily="34" charset="0"/>
+              </a:rPr>
+              <a:t> Phase</a:t>
+            </a:r>
+          </a:p>
+        </p:txBody>
+      </p:sp>
+      <p:sp>
+        <p:nvSpPr>
+          <p:cNvPr id="6" name="Textfeld 5">
+            <a:extLst>
+              <a:ext uri="{FF2B5EF4-FFF2-40B4-BE49-F238E27FC236}">
+                <a16:creationId xmlns:a16="http://schemas.microsoft.com/office/drawing/2014/main" id="{DACAD11C-BB60-4978-9D9F-53388F62B2E2}"/>
+              </a:ext>
+            </a:extLst>
+          </p:cNvPr>
+          <p:cNvSpPr txBox="1"/>
+          <p:nvPr/>
+        </p:nvSpPr>
+        <p:spPr>
+          <a:xfrm>
+            <a:off x="901128" y="1953283"/>
+            <a:ext cx="9489989" cy="646331"/>
+          </a:xfrm>
+          <a:prstGeom prst="rect">
+            <a:avLst/>
+          </a:prstGeom>
+          <a:noFill/>
+        </p:spPr>
+        <p:txBody>
+          <a:bodyPr wrap="square" rtlCol="0">
+            <a:spAutoFit/>
+          </a:bodyPr>
+          <a:lstStyle/>
+          <a:p>
+            <a:pPr marL="285750" indent="-285750">
+              <a:buFont typeface="Arial" panose="020B0604020202020204" pitchFamily="34" charset="0"/>
+              <a:buChar char="•"/>
+            </a:pPr>
+            <a:r>
+              <a:rPr lang="de-DE" dirty="0">
+                <a:latin typeface="Times" pitchFamily="2" charset="0"/>
+                <a:cs typeface="Arial" panose="020B0604020202020204" pitchFamily="34" charset="0"/>
+              </a:rPr>
+              <a:t>Data </a:t>
+            </a:r>
+            <a:r>
+              <a:rPr lang="de-DE" dirty="0" err="1">
+                <a:latin typeface="Times" pitchFamily="2" charset="0"/>
+                <a:cs typeface="Arial" panose="020B0604020202020204" pitchFamily="34" charset="0"/>
+              </a:rPr>
+              <a:t>Preparation</a:t>
+            </a:r>
+            <a:r>
+              <a:rPr lang="de-DE" dirty="0">
+                <a:latin typeface="Times" pitchFamily="2" charset="0"/>
+                <a:cs typeface="Arial" panose="020B0604020202020204" pitchFamily="34" charset="0"/>
+              </a:rPr>
+              <a:t> </a:t>
+            </a:r>
+          </a:p>
+          <a:p>
+            <a:pPr marL="285750" indent="-285750">
+              <a:buFont typeface="Arial" panose="020B0604020202020204" pitchFamily="34" charset="0"/>
+              <a:buChar char="•"/>
+            </a:pPr>
+            <a:r>
+              <a:rPr lang="de-DE" dirty="0" err="1">
+                <a:latin typeface="Times" pitchFamily="2" charset="0"/>
+                <a:cs typeface="Arial" panose="020B0604020202020204" pitchFamily="34" charset="0"/>
+              </a:rPr>
+              <a:t>Cleansing</a:t>
+            </a:r>
+            <a:endParaRPr lang="de-DE" dirty="0">
+              <a:latin typeface="Times" pitchFamily="2" charset="0"/>
+              <a:cs typeface="Arial" panose="020B0604020202020204" pitchFamily="34" charset="0"/>
+            </a:endParaRPr>
           </a:p>
         </p:txBody>
       </p:sp>
       <p:pic>
         <p:nvPicPr>
-          <p:cNvPr id="3" name="Grafik 2">
+          <p:cNvPr id="7" name="Grafik 6">
             <a:extLst>
               <a:ext uri="{FF2B5EF4-FFF2-40B4-BE49-F238E27FC236}">
-                <a16:creationId xmlns:a16="http://schemas.microsoft.com/office/drawing/2014/main" id="{29535A4A-85E9-4B1B-B6BD-24A5216F9739}"/>
+                <a16:creationId xmlns:a16="http://schemas.microsoft.com/office/drawing/2014/main" id="{CC039438-7CCF-4504-8EF3-C60441311620}"/>
               </a:ext>
             </a:extLst>
           </p:cNvPr>
@@ -10295,56 +10693,18 @@
         </p:blipFill>
         <p:spPr>
           <a:xfrm>
-            <a:off x="3270422" y="667263"/>
-            <a:ext cx="6944497" cy="5599495"/>
+            <a:off x="4006656" y="1693763"/>
+            <a:ext cx="8012349" cy="5007718"/>
           </a:xfrm>
           <a:prstGeom prst="rect">
             <a:avLst/>
           </a:prstGeom>
         </p:spPr>
       </p:pic>
-      <p:sp>
-        <p:nvSpPr>
-          <p:cNvPr id="5" name="Textfeld 4">
-            <a:extLst>
-              <a:ext uri="{FF2B5EF4-FFF2-40B4-BE49-F238E27FC236}">
-                <a16:creationId xmlns:a16="http://schemas.microsoft.com/office/drawing/2014/main" id="{AD024712-EA85-4558-8B3B-B99CAF87ECC2}"/>
-              </a:ext>
-            </a:extLst>
-          </p:cNvPr>
-          <p:cNvSpPr txBox="1"/>
-          <p:nvPr/>
-        </p:nvSpPr>
-        <p:spPr>
-          <a:xfrm>
-            <a:off x="5577016" y="6367849"/>
-            <a:ext cx="2331308" cy="307777"/>
-          </a:xfrm>
-          <a:prstGeom prst="rect">
-            <a:avLst/>
-          </a:prstGeom>
-          <a:noFill/>
-        </p:spPr>
-        <p:txBody>
-          <a:bodyPr wrap="square" rtlCol="0">
-            <a:spAutoFit/>
-          </a:bodyPr>
-          <a:lstStyle/>
-          <a:p>
-            <a:r>
-              <a:rPr lang="de-DE" sz="1400" dirty="0">
-                <a:latin typeface="Times" pitchFamily="2" charset="0"/>
-                <a:cs typeface="Arial" panose="020B0604020202020204" pitchFamily="34" charset="0"/>
-              </a:rPr>
-              <a:t>Figure 2: Star Schema</a:t>
-            </a:r>
-          </a:p>
-        </p:txBody>
-      </p:sp>
     </p:spTree>
     <p:extLst>
       <p:ext uri="{BB962C8B-B14F-4D97-AF65-F5344CB8AC3E}">
-        <p14:creationId xmlns:p14="http://schemas.microsoft.com/office/powerpoint/2010/main" val="102582351"/>
+        <p14:creationId xmlns:p14="http://schemas.microsoft.com/office/powerpoint/2010/main" val="3085713717"/>
       </p:ext>
     </p:extLst>
   </p:cSld>

</xml_diff>